<commit_message>
Added PostgresCatalogue to rdbms_classes.pptx
</commit_message>
<xml_diff>
--- a/catalogue/rdbms_classes.pptx
+++ b/catalogue/rdbms_classes.pptx
@@ -7,6 +7,7 @@
   <p:sldIdLst>
     <p:sldId id="257" r:id="rId2"/>
     <p:sldId id="258" r:id="rId3"/>
+    <p:sldId id="259" r:id="rId4"/>
   </p:sldIdLst>
   <p:sldSz cx="12192000" cy="6858000"/>
   <p:notesSz cx="6858000" cy="9144000"/>
@@ -244,7 +245,7 @@
           <a:p>
             <a:fld id="{A324B053-0AC1-C047-A94D-AE791A5219A0}" type="datetimeFigureOut">
               <a:rPr lang="en-US" smtClean="0"/>
-              <a:t>11/1/18</a:t>
+              <a:t>9/27/19</a:t>
             </a:fld>
             <a:endParaRPr lang="en-US"/>
           </a:p>
@@ -414,7 +415,7 @@
           <a:p>
             <a:fld id="{A324B053-0AC1-C047-A94D-AE791A5219A0}" type="datetimeFigureOut">
               <a:rPr lang="en-US" smtClean="0"/>
-              <a:t>11/1/18</a:t>
+              <a:t>9/27/19</a:t>
             </a:fld>
             <a:endParaRPr lang="en-US"/>
           </a:p>
@@ -594,7 +595,7 @@
           <a:p>
             <a:fld id="{A324B053-0AC1-C047-A94D-AE791A5219A0}" type="datetimeFigureOut">
               <a:rPr lang="en-US" smtClean="0"/>
-              <a:t>11/1/18</a:t>
+              <a:t>9/27/19</a:t>
             </a:fld>
             <a:endParaRPr lang="en-US"/>
           </a:p>
@@ -764,7 +765,7 @@
           <a:p>
             <a:fld id="{A324B053-0AC1-C047-A94D-AE791A5219A0}" type="datetimeFigureOut">
               <a:rPr lang="en-US" smtClean="0"/>
-              <a:t>11/1/18</a:t>
+              <a:t>9/27/19</a:t>
             </a:fld>
             <a:endParaRPr lang="en-US"/>
           </a:p>
@@ -1010,7 +1011,7 @@
           <a:p>
             <a:fld id="{A324B053-0AC1-C047-A94D-AE791A5219A0}" type="datetimeFigureOut">
               <a:rPr lang="en-US" smtClean="0"/>
-              <a:t>11/1/18</a:t>
+              <a:t>9/27/19</a:t>
             </a:fld>
             <a:endParaRPr lang="en-US"/>
           </a:p>
@@ -1242,7 +1243,7 @@
           <a:p>
             <a:fld id="{A324B053-0AC1-C047-A94D-AE791A5219A0}" type="datetimeFigureOut">
               <a:rPr lang="en-US" smtClean="0"/>
-              <a:t>11/1/18</a:t>
+              <a:t>9/27/19</a:t>
             </a:fld>
             <a:endParaRPr lang="en-US"/>
           </a:p>
@@ -1609,7 +1610,7 @@
           <a:p>
             <a:fld id="{A324B053-0AC1-C047-A94D-AE791A5219A0}" type="datetimeFigureOut">
               <a:rPr lang="en-US" smtClean="0"/>
-              <a:t>11/1/18</a:t>
+              <a:t>9/27/19</a:t>
             </a:fld>
             <a:endParaRPr lang="en-US"/>
           </a:p>
@@ -1727,7 +1728,7 @@
           <a:p>
             <a:fld id="{A324B053-0AC1-C047-A94D-AE791A5219A0}" type="datetimeFigureOut">
               <a:rPr lang="en-US" smtClean="0"/>
-              <a:t>11/1/18</a:t>
+              <a:t>9/27/19</a:t>
             </a:fld>
             <a:endParaRPr lang="en-US"/>
           </a:p>
@@ -1822,7 +1823,7 @@
           <a:p>
             <a:fld id="{A324B053-0AC1-C047-A94D-AE791A5219A0}" type="datetimeFigureOut">
               <a:rPr lang="en-US" smtClean="0"/>
-              <a:t>11/1/18</a:t>
+              <a:t>9/27/19</a:t>
             </a:fld>
             <a:endParaRPr lang="en-US"/>
           </a:p>
@@ -2099,7 +2100,7 @@
           <a:p>
             <a:fld id="{A324B053-0AC1-C047-A94D-AE791A5219A0}" type="datetimeFigureOut">
               <a:rPr lang="en-US" smtClean="0"/>
-              <a:t>11/1/18</a:t>
+              <a:t>9/27/19</a:t>
             </a:fld>
             <a:endParaRPr lang="en-US"/>
           </a:p>
@@ -2352,7 +2353,7 @@
           <a:p>
             <a:fld id="{A324B053-0AC1-C047-A94D-AE791A5219A0}" type="datetimeFigureOut">
               <a:rPr lang="en-US" smtClean="0"/>
-              <a:t>11/1/18</a:t>
+              <a:t>9/27/19</a:t>
             </a:fld>
             <a:endParaRPr lang="en-US"/>
           </a:p>
@@ -2565,7 +2566,7 @@
           <a:p>
             <a:fld id="{A324B053-0AC1-C047-A94D-AE791A5219A0}" type="datetimeFigureOut">
               <a:rPr lang="en-US" smtClean="0"/>
-              <a:t>11/1/18</a:t>
+              <a:t>9/27/19</a:t>
             </a:fld>
             <a:endParaRPr lang="en-US"/>
           </a:p>
@@ -2970,29 +2971,154 @@
           <a:chExt cx="0" cy="0"/>
         </a:xfrm>
       </p:grpSpPr>
+      <p:sp>
+        <p:nvSpPr>
+          <p:cNvPr id="27" name="TextBox 26"/>
+          <p:cNvSpPr txBox="1"/>
+          <p:nvPr/>
+        </p:nvSpPr>
+        <p:spPr>
+          <a:xfrm>
+            <a:off x="65662" y="1202723"/>
+            <a:ext cx="6956831" cy="923330"/>
+          </a:xfrm>
+          <a:prstGeom prst="rect">
+            <a:avLst/>
+          </a:prstGeom>
+          <a:noFill/>
+        </p:spPr>
+        <p:txBody>
+          <a:bodyPr wrap="square" rtlCol="0">
+            <a:spAutoFit/>
+          </a:bodyPr>
+          <a:lstStyle/>
+          <a:p>
+            <a:pPr algn="just"/>
+            <a:r>
+              <a:rPr lang="en-US" dirty="0" smtClean="0"/>
+              <a:t>The </a:t>
+            </a:r>
+            <a:r>
+              <a:rPr lang="en-US" dirty="0" err="1" smtClean="0"/>
+              <a:t>RdbmsCatalogue</a:t>
+            </a:r>
+            <a:r>
+              <a:rPr lang="en-US" dirty="0" smtClean="0"/>
+              <a:t> implements of all the Catalogue methods except for those that require database vendor specific API accesses such as bulk inserts or database vendor specific SQL such as database sequences.</a:t>
+            </a:r>
+            <a:endParaRPr lang="en-US" dirty="0"/>
+          </a:p>
+        </p:txBody>
+      </p:sp>
+      <p:sp>
+        <p:nvSpPr>
+          <p:cNvPr id="28" name="TextBox 27"/>
+          <p:cNvSpPr txBox="1"/>
+          <p:nvPr/>
+        </p:nvSpPr>
+        <p:spPr>
+          <a:xfrm>
+            <a:off x="57266" y="90723"/>
+            <a:ext cx="6956831" cy="923330"/>
+          </a:xfrm>
+          <a:prstGeom prst="rect">
+            <a:avLst/>
+          </a:prstGeom>
+          <a:noFill/>
+        </p:spPr>
+        <p:txBody>
+          <a:bodyPr wrap="square" rtlCol="0">
+            <a:spAutoFit/>
+          </a:bodyPr>
+          <a:lstStyle/>
+          <a:p>
+            <a:pPr algn="just"/>
+            <a:r>
+              <a:rPr lang="en-US" dirty="0" smtClean="0"/>
+              <a:t>The Catalogue class is an abstract interface class which facilitates the ability to implement the CTA catalogue using backend data storage technologies other than relational databases.  </a:t>
+            </a:r>
+            <a:endParaRPr lang="en-US" dirty="0"/>
+          </a:p>
+        </p:txBody>
+      </p:sp>
+      <p:sp>
+        <p:nvSpPr>
+          <p:cNvPr id="29" name="TextBox 28"/>
+          <p:cNvSpPr txBox="1"/>
+          <p:nvPr/>
+        </p:nvSpPr>
+        <p:spPr>
+          <a:xfrm>
+            <a:off x="73595" y="5331832"/>
+            <a:ext cx="5931276" cy="1200329"/>
+          </a:xfrm>
+          <a:prstGeom prst="rect">
+            <a:avLst/>
+          </a:prstGeom>
+          <a:noFill/>
+        </p:spPr>
+        <p:txBody>
+          <a:bodyPr wrap="square" rtlCol="0">
+            <a:spAutoFit/>
+          </a:bodyPr>
+          <a:lstStyle/>
+          <a:p>
+            <a:pPr algn="just"/>
+            <a:r>
+              <a:rPr lang="en-US" dirty="0" err="1" smtClean="0"/>
+              <a:t>InMemoryCatalogue</a:t>
+            </a:r>
+            <a:r>
+              <a:rPr lang="en-US" dirty="0" smtClean="0"/>
+              <a:t> objects are different to other </a:t>
+            </a:r>
+            <a:r>
+              <a:rPr lang="en-US" dirty="0" err="1" smtClean="0"/>
+              <a:t>RdbmsCatalogue</a:t>
+            </a:r>
+            <a:r>
+              <a:rPr lang="en-US" dirty="0" smtClean="0"/>
+              <a:t> objects that connect to external databases because </a:t>
+            </a:r>
+            <a:r>
+              <a:rPr lang="en-US" dirty="0" err="1"/>
+              <a:t>InMemoryCatalogue</a:t>
+            </a:r>
+            <a:r>
+              <a:rPr lang="en-US" dirty="0"/>
+              <a:t> objects </a:t>
+            </a:r>
+            <a:r>
+              <a:rPr lang="en-US" dirty="0" smtClean="0"/>
+              <a:t> create the database schema when they are first instantiated. </a:t>
+            </a:r>
+            <a:endParaRPr lang="en-US" dirty="0"/>
+          </a:p>
+        </p:txBody>
+      </p:sp>
       <p:grpSp>
         <p:nvGrpSpPr>
-          <p:cNvPr id="2" name="Group 1"/>
+          <p:cNvPr id="30" name="Group 29"/>
           <p:cNvGrpSpPr/>
           <p:nvPr/>
         </p:nvGrpSpPr>
         <p:grpSpPr>
           <a:xfrm>
-            <a:off x="5996938" y="407543"/>
-            <a:ext cx="6004562" cy="4320525"/>
-            <a:chOff x="387771" y="839343"/>
-            <a:chExt cx="6004562" cy="4320525"/>
+            <a:off x="3039233" y="552388"/>
+            <a:ext cx="8805808" cy="4358053"/>
+            <a:chOff x="1031238" y="636715"/>
+            <a:chExt cx="8805808" cy="4358053"/>
           </a:xfrm>
         </p:grpSpPr>
         <p:sp>
           <p:nvSpPr>
-            <p:cNvPr id="11" name="Rectangle 10"/>
+            <p:cNvPr id="32" name="Rectangle 31"/>
             <p:cNvSpPr/>
             <p:nvPr/>
           </p:nvSpPr>
           <p:spPr>
             <a:xfrm>
-              <a:off x="2939242" y="839343"/>
+              <a:off x="5038483" y="636715"/>
               <a:ext cx="1608668" cy="381000"/>
             </a:xfrm>
             <a:prstGeom prst="rect">
@@ -3027,13 +3153,13 @@
         </p:sp>
         <p:sp>
           <p:nvSpPr>
-            <p:cNvPr id="12" name="TextBox 11"/>
+            <p:cNvPr id="33" name="TextBox 32"/>
             <p:cNvSpPr txBox="1"/>
             <p:nvPr/>
           </p:nvSpPr>
           <p:spPr>
             <a:xfrm>
-              <a:off x="3172576" y="851011"/>
+              <a:off x="5271817" y="648383"/>
               <a:ext cx="1122423" cy="369332"/>
             </a:xfrm>
             <a:prstGeom prst="rect">
@@ -3058,13 +3184,13 @@
         </p:sp>
         <p:sp>
           <p:nvSpPr>
-            <p:cNvPr id="13" name="Rectangle 12"/>
+            <p:cNvPr id="34" name="Rectangle 33"/>
             <p:cNvSpPr/>
             <p:nvPr/>
           </p:nvSpPr>
           <p:spPr>
             <a:xfrm>
-              <a:off x="2939242" y="1798142"/>
+              <a:off x="5038483" y="1595514"/>
               <a:ext cx="1608668" cy="381000"/>
             </a:xfrm>
             <a:prstGeom prst="rect">
@@ -3099,13 +3225,13 @@
         </p:sp>
         <p:sp>
           <p:nvSpPr>
-            <p:cNvPr id="14" name="TextBox 13"/>
+            <p:cNvPr id="36" name="TextBox 35"/>
             <p:cNvSpPr txBox="1"/>
             <p:nvPr/>
           </p:nvSpPr>
           <p:spPr>
             <a:xfrm>
-              <a:off x="2851174" y="1809810"/>
+              <a:off x="4950415" y="1607182"/>
               <a:ext cx="1765228" cy="369332"/>
             </a:xfrm>
             <a:prstGeom prst="rect">
@@ -3128,21 +3254,130 @@
             </a:p>
           </p:txBody>
         </p:sp>
+        <p:cxnSp>
+          <p:nvCxnSpPr>
+            <p:cNvPr id="39" name="Straight Connector 38"/>
+            <p:cNvCxnSpPr/>
+            <p:nvPr/>
+          </p:nvCxnSpPr>
+          <p:spPr>
+            <a:xfrm>
+              <a:off x="5833028" y="1387059"/>
+              <a:ext cx="1" cy="220123"/>
+            </a:xfrm>
+            <a:prstGeom prst="line">
+              <a:avLst/>
+            </a:prstGeom>
+          </p:spPr>
+          <p:style>
+            <a:lnRef idx="1">
+              <a:schemeClr val="accent1"/>
+            </a:lnRef>
+            <a:fillRef idx="0">
+              <a:schemeClr val="accent1"/>
+            </a:fillRef>
+            <a:effectRef idx="0">
+              <a:schemeClr val="accent1"/>
+            </a:effectRef>
+            <a:fontRef idx="minor">
+              <a:schemeClr val="tx1"/>
+            </a:fontRef>
+          </p:style>
+        </p:cxnSp>
         <p:sp>
           <p:nvSpPr>
-            <p:cNvPr id="15" name="Rectangle 14"/>
+            <p:cNvPr id="40" name="Triangle 39"/>
             <p:cNvSpPr/>
             <p:nvPr/>
           </p:nvSpPr>
           <p:spPr>
             <a:xfrm>
-              <a:off x="1165947" y="2799266"/>
-              <a:ext cx="1608668" cy="381000"/>
-            </a:xfrm>
-            <a:prstGeom prst="rect">
+              <a:off x="5543155" y="1964898"/>
+              <a:ext cx="579745" cy="353492"/>
+            </a:xfrm>
+            <a:prstGeom prst="triangle">
               <a:avLst/>
             </a:prstGeom>
-            <a:noFill/>
+            <a:solidFill>
+              <a:schemeClr val="bg1"/>
+            </a:solidFill>
+          </p:spPr>
+          <p:style>
+            <a:lnRef idx="2">
+              <a:schemeClr val="accent1">
+                <a:shade val="50000"/>
+              </a:schemeClr>
+            </a:lnRef>
+            <a:fillRef idx="1">
+              <a:schemeClr val="accent1"/>
+            </a:fillRef>
+            <a:effectRef idx="0">
+              <a:schemeClr val="accent1"/>
+            </a:effectRef>
+            <a:fontRef idx="minor">
+              <a:schemeClr val="lt1"/>
+            </a:fontRef>
+          </p:style>
+          <p:txBody>
+            <a:bodyPr rtlCol="0" anchor="ctr"/>
+            <a:lstStyle/>
+            <a:p>
+              <a:pPr algn="ctr"/>
+              <a:endParaRPr lang="en-US"/>
+            </a:p>
+          </p:txBody>
+        </p:sp>
+        <p:cxnSp>
+          <p:nvCxnSpPr>
+            <p:cNvPr id="43" name="Elbow Connector 42"/>
+            <p:cNvCxnSpPr>
+              <a:stCxn id="55" idx="3"/>
+            </p:cNvCxnSpPr>
+            <p:nvPr/>
+          </p:nvCxnSpPr>
+          <p:spPr>
+            <a:xfrm rot="5400000">
+              <a:off x="4067506" y="860206"/>
+              <a:ext cx="307339" cy="3223707"/>
+            </a:xfrm>
+            <a:prstGeom prst="bentConnector3">
+              <a:avLst>
+                <a:gd name="adj1" fmla="val 50000"/>
+              </a:avLst>
+            </a:prstGeom>
+          </p:spPr>
+          <p:style>
+            <a:lnRef idx="1">
+              <a:schemeClr val="accent1"/>
+            </a:lnRef>
+            <a:fillRef idx="0">
+              <a:schemeClr val="accent1"/>
+            </a:fillRef>
+            <a:effectRef idx="0">
+              <a:schemeClr val="accent1"/>
+            </a:effectRef>
+            <a:fontRef idx="minor">
+              <a:schemeClr val="tx1"/>
+            </a:fontRef>
+          </p:style>
+        </p:cxnSp>
+        <p:sp>
+          <p:nvSpPr>
+            <p:cNvPr id="44" name="Triangle 43"/>
+            <p:cNvSpPr/>
+            <p:nvPr/>
+          </p:nvSpPr>
+          <p:spPr>
+            <a:xfrm>
+              <a:off x="5543155" y="1033567"/>
+              <a:ext cx="579745" cy="353492"/>
+            </a:xfrm>
+            <a:prstGeom prst="triangle">
+              <a:avLst/>
+            </a:prstGeom>
+            <a:solidFill>
+              <a:schemeClr val="bg1"/>
+            </a:solidFill>
           </p:spPr>
           <p:style>
             <a:lnRef idx="2">
@@ -3171,78 +3406,14 @@
         </p:sp>
         <p:sp>
           <p:nvSpPr>
-            <p:cNvPr id="16" name="TextBox 15"/>
-            <p:cNvSpPr txBox="1"/>
+            <p:cNvPr id="49" name="Rectangle 48"/>
+            <p:cNvSpPr/>
             <p:nvPr/>
           </p:nvSpPr>
           <p:spPr>
             <a:xfrm>
-              <a:off x="1137542" y="2810934"/>
-              <a:ext cx="1645900" cy="369332"/>
-            </a:xfrm>
-            <a:prstGeom prst="rect">
-              <a:avLst/>
-            </a:prstGeom>
-            <a:noFill/>
-          </p:spPr>
-          <p:txBody>
-            <a:bodyPr wrap="none" rtlCol="0">
-              <a:spAutoFit/>
-            </a:bodyPr>
-            <a:lstStyle/>
-            <a:p>
-              <a:pPr algn="ctr"/>
-              <a:r>
-                <a:rPr lang="en-US" dirty="0" err="1" smtClean="0"/>
-                <a:t>SqliteCatalogue</a:t>
-              </a:r>
-              <a:endParaRPr lang="en-US" dirty="0"/>
-            </a:p>
-          </p:txBody>
-        </p:sp>
-        <p:cxnSp>
-          <p:nvCxnSpPr>
-            <p:cNvPr id="18" name="Straight Connector 17"/>
-            <p:cNvCxnSpPr>
-              <a:stCxn id="38" idx="3"/>
-              <a:endCxn id="14" idx="0"/>
-            </p:cNvCxnSpPr>
-            <p:nvPr/>
-          </p:nvCxnSpPr>
-          <p:spPr>
-            <a:xfrm>
-              <a:off x="3733787" y="1589687"/>
-              <a:ext cx="1" cy="220123"/>
-            </a:xfrm>
-            <a:prstGeom prst="line">
-              <a:avLst/>
-            </a:prstGeom>
-          </p:spPr>
-          <p:style>
-            <a:lnRef idx="1">
-              <a:schemeClr val="accent1"/>
-            </a:lnRef>
-            <a:fillRef idx="0">
-              <a:schemeClr val="accent1"/>
-            </a:fillRef>
-            <a:effectRef idx="0">
-              <a:schemeClr val="accent1"/>
-            </a:effectRef>
-            <a:fontRef idx="minor">
-              <a:schemeClr val="tx1"/>
-            </a:fontRef>
-          </p:style>
-        </p:cxnSp>
-        <p:sp>
-          <p:nvSpPr>
-            <p:cNvPr id="19" name="Rectangle 18"/>
-            <p:cNvSpPr/>
-            <p:nvPr/>
-          </p:nvSpPr>
-          <p:spPr>
-            <a:xfrm>
-              <a:off x="2940438" y="2822602"/>
-              <a:ext cx="1608668" cy="381000"/>
+              <a:off x="1031238" y="3582433"/>
+              <a:ext cx="3166893" cy="369332"/>
             </a:xfrm>
             <a:prstGeom prst="rect">
               <a:avLst/>
@@ -3276,342 +3447,13 @@
         </p:sp>
         <p:sp>
           <p:nvSpPr>
-            <p:cNvPr id="20" name="TextBox 19"/>
+            <p:cNvPr id="50" name="TextBox 49"/>
             <p:cNvSpPr txBox="1"/>
             <p:nvPr/>
           </p:nvSpPr>
           <p:spPr>
             <a:xfrm>
-              <a:off x="2871510" y="2834270"/>
-              <a:ext cx="1726948" cy="369332"/>
-            </a:xfrm>
-            <a:prstGeom prst="rect">
-              <a:avLst/>
-            </a:prstGeom>
-            <a:noFill/>
-          </p:spPr>
-          <p:txBody>
-            <a:bodyPr wrap="none" rtlCol="0">
-              <a:spAutoFit/>
-            </a:bodyPr>
-            <a:lstStyle/>
-            <a:p>
-              <a:pPr algn="ctr"/>
-              <a:r>
-                <a:rPr lang="en-US" dirty="0" err="1" smtClean="0"/>
-                <a:t>OracleCatalogue</a:t>
-              </a:r>
-              <a:endParaRPr lang="en-US" dirty="0"/>
-            </a:p>
-          </p:txBody>
-        </p:sp>
-        <p:sp>
-          <p:nvSpPr>
-            <p:cNvPr id="21" name="Rectangle 20"/>
-            <p:cNvSpPr/>
-            <p:nvPr/>
-          </p:nvSpPr>
-          <p:spPr>
-            <a:xfrm>
-              <a:off x="4754672" y="2822602"/>
-              <a:ext cx="1608668" cy="381000"/>
-            </a:xfrm>
-            <a:prstGeom prst="rect">
-              <a:avLst/>
-            </a:prstGeom>
-            <a:noFill/>
-          </p:spPr>
-          <p:style>
-            <a:lnRef idx="2">
-              <a:schemeClr val="accent1">
-                <a:shade val="50000"/>
-              </a:schemeClr>
-            </a:lnRef>
-            <a:fillRef idx="1">
-              <a:schemeClr val="accent1"/>
-            </a:fillRef>
-            <a:effectRef idx="0">
-              <a:schemeClr val="accent1"/>
-            </a:effectRef>
-            <a:fontRef idx="minor">
-              <a:schemeClr val="lt1"/>
-            </a:fontRef>
-          </p:style>
-          <p:txBody>
-            <a:bodyPr rtlCol="0" anchor="ctr"/>
-            <a:lstStyle/>
-            <a:p>
-              <a:pPr algn="ctr"/>
-              <a:endParaRPr lang="en-US"/>
-            </a:p>
-          </p:txBody>
-        </p:sp>
-        <p:sp>
-          <p:nvSpPr>
-            <p:cNvPr id="22" name="TextBox 21"/>
-            <p:cNvSpPr txBox="1"/>
-            <p:nvPr/>
-          </p:nvSpPr>
-          <p:spPr>
-            <a:xfrm>
-              <a:off x="4706102" y="2834270"/>
-              <a:ext cx="1686231" cy="369332"/>
-            </a:xfrm>
-            <a:prstGeom prst="rect">
-              <a:avLst/>
-            </a:prstGeom>
-            <a:noFill/>
-          </p:spPr>
-          <p:txBody>
-            <a:bodyPr wrap="none" rtlCol="0">
-              <a:spAutoFit/>
-            </a:bodyPr>
-            <a:lstStyle/>
-            <a:p>
-              <a:pPr algn="ctr"/>
-              <a:r>
-                <a:rPr lang="en-US" dirty="0" err="1" smtClean="0"/>
-                <a:t>MysqlCatalogue</a:t>
-              </a:r>
-              <a:endParaRPr lang="en-US" dirty="0"/>
-            </a:p>
-          </p:txBody>
-        </p:sp>
-        <p:cxnSp>
-          <p:nvCxnSpPr>
-            <p:cNvPr id="26" name="Straight Connector 25"/>
-            <p:cNvCxnSpPr>
-              <a:stCxn id="31" idx="3"/>
-              <a:endCxn id="19" idx="0"/>
-            </p:cNvCxnSpPr>
-            <p:nvPr/>
-          </p:nvCxnSpPr>
-          <p:spPr>
-            <a:xfrm>
-              <a:off x="3733787" y="2521018"/>
-              <a:ext cx="10985" cy="301584"/>
-            </a:xfrm>
-            <a:prstGeom prst="line">
-              <a:avLst/>
-            </a:prstGeom>
-          </p:spPr>
-          <p:style>
-            <a:lnRef idx="1">
-              <a:schemeClr val="accent1"/>
-            </a:lnRef>
-            <a:fillRef idx="0">
-              <a:schemeClr val="accent1"/>
-            </a:fillRef>
-            <a:effectRef idx="0">
-              <a:schemeClr val="accent1"/>
-            </a:effectRef>
-            <a:fontRef idx="minor">
-              <a:schemeClr val="tx1"/>
-            </a:fontRef>
-          </p:style>
-        </p:cxnSp>
-        <p:sp>
-          <p:nvSpPr>
-            <p:cNvPr id="31" name="Triangle 30"/>
-            <p:cNvSpPr/>
-            <p:nvPr/>
-          </p:nvSpPr>
-          <p:spPr>
-            <a:xfrm>
-              <a:off x="3443914" y="2167526"/>
-              <a:ext cx="579745" cy="353492"/>
-            </a:xfrm>
-            <a:prstGeom prst="triangle">
-              <a:avLst/>
-            </a:prstGeom>
-            <a:solidFill>
-              <a:schemeClr val="bg1"/>
-            </a:solidFill>
-          </p:spPr>
-          <p:style>
-            <a:lnRef idx="2">
-              <a:schemeClr val="accent1">
-                <a:shade val="50000"/>
-              </a:schemeClr>
-            </a:lnRef>
-            <a:fillRef idx="1">
-              <a:schemeClr val="accent1"/>
-            </a:fillRef>
-            <a:effectRef idx="0">
-              <a:schemeClr val="accent1"/>
-            </a:effectRef>
-            <a:fontRef idx="minor">
-              <a:schemeClr val="lt1"/>
-            </a:fontRef>
-          </p:style>
-          <p:txBody>
-            <a:bodyPr rtlCol="0" anchor="ctr"/>
-            <a:lstStyle/>
-            <a:p>
-              <a:pPr algn="ctr"/>
-              <a:endParaRPr lang="en-US"/>
-            </a:p>
-          </p:txBody>
-        </p:sp>
-        <p:cxnSp>
-          <p:nvCxnSpPr>
-            <p:cNvPr id="35" name="Elbow Connector 34"/>
-            <p:cNvCxnSpPr>
-              <a:stCxn id="31" idx="3"/>
-              <a:endCxn id="21" idx="0"/>
-            </p:cNvCxnSpPr>
-            <p:nvPr/>
-          </p:nvCxnSpPr>
-          <p:spPr>
-            <a:xfrm rot="16200000" flipH="1">
-              <a:off x="4495604" y="1759200"/>
-              <a:ext cx="301584" cy="1825219"/>
-            </a:xfrm>
-            <a:prstGeom prst="bentConnector3">
-              <a:avLst/>
-            </a:prstGeom>
-          </p:spPr>
-          <p:style>
-            <a:lnRef idx="1">
-              <a:schemeClr val="accent1"/>
-            </a:lnRef>
-            <a:fillRef idx="0">
-              <a:schemeClr val="accent1"/>
-            </a:fillRef>
-            <a:effectRef idx="0">
-              <a:schemeClr val="accent1"/>
-            </a:effectRef>
-            <a:fontRef idx="minor">
-              <a:schemeClr val="tx1"/>
-            </a:fontRef>
-          </p:style>
-        </p:cxnSp>
-        <p:cxnSp>
-          <p:nvCxnSpPr>
-            <p:cNvPr id="37" name="Elbow Connector 36"/>
-            <p:cNvCxnSpPr>
-              <a:stCxn id="31" idx="3"/>
-              <a:endCxn id="15" idx="0"/>
-            </p:cNvCxnSpPr>
-            <p:nvPr/>
-          </p:nvCxnSpPr>
-          <p:spPr>
-            <a:xfrm rot="5400000">
-              <a:off x="2712910" y="1778389"/>
-              <a:ext cx="278248" cy="1763506"/>
-            </a:xfrm>
-            <a:prstGeom prst="bentConnector3">
-              <a:avLst/>
-            </a:prstGeom>
-          </p:spPr>
-          <p:style>
-            <a:lnRef idx="1">
-              <a:schemeClr val="accent1"/>
-            </a:lnRef>
-            <a:fillRef idx="0">
-              <a:schemeClr val="accent1"/>
-            </a:fillRef>
-            <a:effectRef idx="0">
-              <a:schemeClr val="accent1"/>
-            </a:effectRef>
-            <a:fontRef idx="minor">
-              <a:schemeClr val="tx1"/>
-            </a:fontRef>
-          </p:style>
-        </p:cxnSp>
-        <p:sp>
-          <p:nvSpPr>
-            <p:cNvPr id="38" name="Triangle 37"/>
-            <p:cNvSpPr/>
-            <p:nvPr/>
-          </p:nvSpPr>
-          <p:spPr>
-            <a:xfrm>
-              <a:off x="3443914" y="1236195"/>
-              <a:ext cx="579745" cy="353492"/>
-            </a:xfrm>
-            <a:prstGeom prst="triangle">
-              <a:avLst/>
-            </a:prstGeom>
-            <a:solidFill>
-              <a:schemeClr val="bg1"/>
-            </a:solidFill>
-          </p:spPr>
-          <p:style>
-            <a:lnRef idx="2">
-              <a:schemeClr val="accent1">
-                <a:shade val="50000"/>
-              </a:schemeClr>
-            </a:lnRef>
-            <a:fillRef idx="1">
-              <a:schemeClr val="accent1"/>
-            </a:fillRef>
-            <a:effectRef idx="0">
-              <a:schemeClr val="accent1"/>
-            </a:effectRef>
-            <a:fontRef idx="minor">
-              <a:schemeClr val="lt1"/>
-            </a:fontRef>
-          </p:style>
-          <p:txBody>
-            <a:bodyPr rtlCol="0" anchor="ctr"/>
-            <a:lstStyle/>
-            <a:p>
-              <a:pPr algn="ctr"/>
-              <a:endParaRPr lang="en-US"/>
-            </a:p>
-          </p:txBody>
-        </p:sp>
-        <p:sp>
-          <p:nvSpPr>
-            <p:cNvPr id="41" name="Rectangle 40"/>
-            <p:cNvSpPr/>
-            <p:nvPr/>
-          </p:nvSpPr>
-          <p:spPr>
-            <a:xfrm>
-              <a:off x="387771" y="3747533"/>
-              <a:ext cx="3166893" cy="369332"/>
-            </a:xfrm>
-            <a:prstGeom prst="rect">
-              <a:avLst/>
-            </a:prstGeom>
-            <a:noFill/>
-          </p:spPr>
-          <p:style>
-            <a:lnRef idx="2">
-              <a:schemeClr val="accent1">
-                <a:shade val="50000"/>
-              </a:schemeClr>
-            </a:lnRef>
-            <a:fillRef idx="1">
-              <a:schemeClr val="accent1"/>
-            </a:fillRef>
-            <a:effectRef idx="0">
-              <a:schemeClr val="accent1"/>
-            </a:effectRef>
-            <a:fontRef idx="minor">
-              <a:schemeClr val="lt1"/>
-            </a:fontRef>
-          </p:style>
-          <p:txBody>
-            <a:bodyPr rtlCol="0" anchor="ctr"/>
-            <a:lstStyle/>
-            <a:p>
-              <a:pPr algn="ctr"/>
-              <a:endParaRPr lang="en-US"/>
-            </a:p>
-          </p:txBody>
-        </p:sp>
-        <p:sp>
-          <p:nvSpPr>
-            <p:cNvPr id="42" name="TextBox 41"/>
-            <p:cNvSpPr txBox="1"/>
-            <p:nvPr/>
-          </p:nvSpPr>
-          <p:spPr>
-            <a:xfrm>
-              <a:off x="387771" y="3759201"/>
+              <a:off x="1031238" y="3594101"/>
               <a:ext cx="3166894" cy="369332"/>
             </a:xfrm>
             <a:prstGeom prst="rect">
@@ -3636,13 +3478,13 @@
         </p:sp>
         <p:sp>
           <p:nvSpPr>
-            <p:cNvPr id="45" name="Rectangle 44"/>
+            <p:cNvPr id="51" name="Rectangle 50"/>
             <p:cNvSpPr/>
             <p:nvPr/>
           </p:nvSpPr>
           <p:spPr>
             <a:xfrm>
-              <a:off x="917300" y="4767200"/>
+              <a:off x="1560767" y="4602100"/>
               <a:ext cx="2105961" cy="392668"/>
             </a:xfrm>
             <a:prstGeom prst="rect">
@@ -3677,13 +3519,13 @@
         </p:sp>
         <p:sp>
           <p:nvSpPr>
-            <p:cNvPr id="46" name="TextBox 45"/>
+            <p:cNvPr id="53" name="TextBox 52"/>
             <p:cNvSpPr txBox="1"/>
             <p:nvPr/>
           </p:nvSpPr>
           <p:spPr>
             <a:xfrm>
-              <a:off x="917300" y="4778868"/>
+              <a:off x="1560767" y="4613768"/>
               <a:ext cx="2105962" cy="369332"/>
             </a:xfrm>
             <a:prstGeom prst="rect">
@@ -3708,13 +3550,13 @@
         </p:sp>
         <p:sp>
           <p:nvSpPr>
-            <p:cNvPr id="47" name="Triangle 46"/>
+            <p:cNvPr id="55" name="Triangle 54"/>
             <p:cNvSpPr/>
             <p:nvPr/>
           </p:nvSpPr>
           <p:spPr>
             <a:xfrm>
-              <a:off x="1670619" y="3177663"/>
+              <a:off x="2314086" y="3012563"/>
               <a:ext cx="579745" cy="353492"/>
             </a:xfrm>
             <a:prstGeom prst="triangle">
@@ -3751,13 +3593,13 @@
         </p:sp>
         <p:sp>
           <p:nvSpPr>
-            <p:cNvPr id="48" name="Triangle 47"/>
+            <p:cNvPr id="56" name="Triangle 55"/>
             <p:cNvSpPr/>
             <p:nvPr/>
           </p:nvSpPr>
           <p:spPr>
             <a:xfrm>
-              <a:off x="1670619" y="4133505"/>
+              <a:off x="2314086" y="3968405"/>
               <a:ext cx="579745" cy="353492"/>
             </a:xfrm>
             <a:prstGeom prst="triangle">
@@ -3794,16 +3636,13 @@
         </p:sp>
         <p:cxnSp>
           <p:nvCxnSpPr>
-            <p:cNvPr id="52" name="Straight Connector 51"/>
-            <p:cNvCxnSpPr>
-              <a:stCxn id="47" idx="3"/>
-              <a:endCxn id="42" idx="0"/>
-            </p:cNvCxnSpPr>
+            <p:cNvPr id="57" name="Straight Connector 56"/>
+            <p:cNvCxnSpPr/>
             <p:nvPr/>
           </p:nvCxnSpPr>
           <p:spPr>
             <a:xfrm>
-              <a:off x="1960492" y="3531155"/>
+              <a:off x="2603959" y="3366055"/>
               <a:ext cx="10726" cy="228046"/>
             </a:xfrm>
             <a:prstGeom prst="line">
@@ -3827,20 +3666,480 @@
         </p:cxnSp>
         <p:cxnSp>
           <p:nvCxnSpPr>
-            <p:cNvPr id="54" name="Straight Connector 53"/>
-            <p:cNvCxnSpPr>
-              <a:stCxn id="48" idx="3"/>
-              <a:endCxn id="46" idx="0"/>
-            </p:cNvCxnSpPr>
+            <p:cNvPr id="58" name="Straight Connector 57"/>
+            <p:cNvCxnSpPr/>
             <p:nvPr/>
           </p:nvCxnSpPr>
           <p:spPr>
             <a:xfrm>
-              <a:off x="1960492" y="4486997"/>
+              <a:off x="2603959" y="4321897"/>
               <a:ext cx="9789" cy="291871"/>
             </a:xfrm>
             <a:prstGeom prst="line">
               <a:avLst/>
+            </a:prstGeom>
+          </p:spPr>
+          <p:style>
+            <a:lnRef idx="1">
+              <a:schemeClr val="accent1"/>
+            </a:lnRef>
+            <a:fillRef idx="0">
+              <a:schemeClr val="accent1"/>
+            </a:fillRef>
+            <a:effectRef idx="0">
+              <a:schemeClr val="accent1"/>
+            </a:effectRef>
+            <a:fontRef idx="minor">
+              <a:schemeClr val="tx1"/>
+            </a:fontRef>
+          </p:style>
+        </p:cxnSp>
+        <p:grpSp>
+          <p:nvGrpSpPr>
+            <p:cNvPr id="59" name="Group 58"/>
+            <p:cNvGrpSpPr/>
+            <p:nvPr/>
+          </p:nvGrpSpPr>
+          <p:grpSpPr>
+            <a:xfrm>
+              <a:off x="5833029" y="2631563"/>
+              <a:ext cx="1913730" cy="381000"/>
+              <a:chOff x="6173665" y="3203602"/>
+              <a:chExt cx="1913730" cy="381000"/>
+            </a:xfrm>
+          </p:grpSpPr>
+          <p:sp>
+            <p:nvSpPr>
+              <p:cNvPr id="72" name="Rectangle 71"/>
+              <p:cNvSpPr/>
+              <p:nvPr/>
+            </p:nvSpPr>
+            <p:spPr>
+              <a:xfrm>
+                <a:off x="6173665" y="3203602"/>
+                <a:ext cx="1913730" cy="381000"/>
+              </a:xfrm>
+              <a:prstGeom prst="rect">
+                <a:avLst/>
+              </a:prstGeom>
+              <a:noFill/>
+            </p:spPr>
+            <p:style>
+              <a:lnRef idx="2">
+                <a:schemeClr val="accent1">
+                  <a:shade val="50000"/>
+                </a:schemeClr>
+              </a:lnRef>
+              <a:fillRef idx="1">
+                <a:schemeClr val="accent1"/>
+              </a:fillRef>
+              <a:effectRef idx="0">
+                <a:schemeClr val="accent1"/>
+              </a:effectRef>
+              <a:fontRef idx="minor">
+                <a:schemeClr val="lt1"/>
+              </a:fontRef>
+            </p:style>
+            <p:txBody>
+              <a:bodyPr rtlCol="0" anchor="ctr"/>
+              <a:lstStyle/>
+              <a:p>
+                <a:pPr algn="ctr"/>
+                <a:endParaRPr lang="en-US"/>
+              </a:p>
+            </p:txBody>
+          </p:sp>
+          <p:sp>
+            <p:nvSpPr>
+              <p:cNvPr id="73" name="TextBox 72"/>
+              <p:cNvSpPr txBox="1"/>
+              <p:nvPr/>
+            </p:nvSpPr>
+            <p:spPr>
+              <a:xfrm>
+                <a:off x="6173665" y="3203602"/>
+                <a:ext cx="1913730" cy="369332"/>
+              </a:xfrm>
+              <a:prstGeom prst="rect">
+                <a:avLst/>
+              </a:prstGeom>
+              <a:noFill/>
+            </p:spPr>
+            <p:txBody>
+              <a:bodyPr wrap="none" rtlCol="0">
+                <a:spAutoFit/>
+              </a:bodyPr>
+              <a:lstStyle/>
+              <a:p>
+                <a:pPr algn="ctr"/>
+                <a:r>
+                  <a:rPr lang="en-US" dirty="0" err="1" smtClean="0"/>
+                  <a:t>PostgresCatalogue</a:t>
+                </a:r>
+                <a:endParaRPr lang="en-US" dirty="0"/>
+              </a:p>
+            </p:txBody>
+          </p:sp>
+        </p:grpSp>
+        <p:grpSp>
+          <p:nvGrpSpPr>
+            <p:cNvPr id="60" name="Group 59"/>
+            <p:cNvGrpSpPr/>
+            <p:nvPr/>
+          </p:nvGrpSpPr>
+          <p:grpSpPr>
+            <a:xfrm>
+              <a:off x="7923316" y="2634660"/>
+              <a:ext cx="1913730" cy="381000"/>
+              <a:chOff x="6173665" y="3203602"/>
+              <a:chExt cx="1913730" cy="381000"/>
+            </a:xfrm>
+          </p:grpSpPr>
+          <p:sp>
+            <p:nvSpPr>
+              <p:cNvPr id="70" name="Rectangle 69"/>
+              <p:cNvSpPr/>
+              <p:nvPr/>
+            </p:nvSpPr>
+            <p:spPr>
+              <a:xfrm>
+                <a:off x="6173665" y="3203602"/>
+                <a:ext cx="1913730" cy="381000"/>
+              </a:xfrm>
+              <a:prstGeom prst="rect">
+                <a:avLst/>
+              </a:prstGeom>
+              <a:noFill/>
+            </p:spPr>
+            <p:style>
+              <a:lnRef idx="2">
+                <a:schemeClr val="accent1">
+                  <a:shade val="50000"/>
+                </a:schemeClr>
+              </a:lnRef>
+              <a:fillRef idx="1">
+                <a:schemeClr val="accent1"/>
+              </a:fillRef>
+              <a:effectRef idx="0">
+                <a:schemeClr val="accent1"/>
+              </a:effectRef>
+              <a:fontRef idx="minor">
+                <a:schemeClr val="lt1"/>
+              </a:fontRef>
+            </p:style>
+            <p:txBody>
+              <a:bodyPr rtlCol="0" anchor="ctr"/>
+              <a:lstStyle/>
+              <a:p>
+                <a:pPr algn="ctr"/>
+                <a:endParaRPr lang="en-US"/>
+              </a:p>
+            </p:txBody>
+          </p:sp>
+          <p:sp>
+            <p:nvSpPr>
+              <p:cNvPr id="71" name="TextBox 70"/>
+              <p:cNvSpPr txBox="1"/>
+              <p:nvPr/>
+            </p:nvSpPr>
+            <p:spPr>
+              <a:xfrm>
+                <a:off x="6287414" y="3203602"/>
+                <a:ext cx="1686231" cy="369332"/>
+              </a:xfrm>
+              <a:prstGeom prst="rect">
+                <a:avLst/>
+              </a:prstGeom>
+              <a:noFill/>
+            </p:spPr>
+            <p:txBody>
+              <a:bodyPr wrap="none" rtlCol="0">
+                <a:spAutoFit/>
+              </a:bodyPr>
+              <a:lstStyle/>
+              <a:p>
+                <a:pPr algn="ctr"/>
+                <a:r>
+                  <a:rPr lang="en-US" dirty="0" err="1" smtClean="0"/>
+                  <a:t>Mysql</a:t>
+                </a:r>
+                <a:r>
+                  <a:rPr lang="en-US" dirty="0" err="1" smtClean="0"/>
+                  <a:t>Catalogue</a:t>
+                </a:r>
+                <a:endParaRPr lang="en-US" dirty="0"/>
+              </a:p>
+            </p:txBody>
+          </p:sp>
+        </p:grpSp>
+        <p:grpSp>
+          <p:nvGrpSpPr>
+            <p:cNvPr id="61" name="Group 60"/>
+            <p:cNvGrpSpPr/>
+            <p:nvPr/>
+          </p:nvGrpSpPr>
+          <p:grpSpPr>
+            <a:xfrm>
+              <a:off x="1652457" y="2625729"/>
+              <a:ext cx="1913730" cy="381000"/>
+              <a:chOff x="6173665" y="3203602"/>
+              <a:chExt cx="1913730" cy="381000"/>
+            </a:xfrm>
+          </p:grpSpPr>
+          <p:sp>
+            <p:nvSpPr>
+              <p:cNvPr id="68" name="Rectangle 67"/>
+              <p:cNvSpPr/>
+              <p:nvPr/>
+            </p:nvSpPr>
+            <p:spPr>
+              <a:xfrm>
+                <a:off x="6173665" y="3203602"/>
+                <a:ext cx="1913730" cy="381000"/>
+              </a:xfrm>
+              <a:prstGeom prst="rect">
+                <a:avLst/>
+              </a:prstGeom>
+              <a:noFill/>
+            </p:spPr>
+            <p:style>
+              <a:lnRef idx="2">
+                <a:schemeClr val="accent1">
+                  <a:shade val="50000"/>
+                </a:schemeClr>
+              </a:lnRef>
+              <a:fillRef idx="1">
+                <a:schemeClr val="accent1"/>
+              </a:fillRef>
+              <a:effectRef idx="0">
+                <a:schemeClr val="accent1"/>
+              </a:effectRef>
+              <a:fontRef idx="minor">
+                <a:schemeClr val="lt1"/>
+              </a:fontRef>
+            </p:style>
+            <p:txBody>
+              <a:bodyPr rtlCol="0" anchor="ctr"/>
+              <a:lstStyle/>
+              <a:p>
+                <a:pPr algn="ctr"/>
+                <a:endParaRPr lang="en-US"/>
+              </a:p>
+            </p:txBody>
+          </p:sp>
+          <p:sp>
+            <p:nvSpPr>
+              <p:cNvPr id="69" name="TextBox 68"/>
+              <p:cNvSpPr txBox="1"/>
+              <p:nvPr/>
+            </p:nvSpPr>
+            <p:spPr>
+              <a:xfrm>
+                <a:off x="6307579" y="3203602"/>
+                <a:ext cx="1645900" cy="369332"/>
+              </a:xfrm>
+              <a:prstGeom prst="rect">
+                <a:avLst/>
+              </a:prstGeom>
+              <a:noFill/>
+            </p:spPr>
+            <p:txBody>
+              <a:bodyPr wrap="none" rtlCol="0">
+                <a:spAutoFit/>
+              </a:bodyPr>
+              <a:lstStyle/>
+              <a:p>
+                <a:pPr algn="ctr"/>
+                <a:r>
+                  <a:rPr lang="en-US" dirty="0" err="1" smtClean="0"/>
+                  <a:t>Sqlite</a:t>
+                </a:r>
+                <a:r>
+                  <a:rPr lang="en-US" dirty="0" err="1" smtClean="0"/>
+                  <a:t>Catalogue</a:t>
+                </a:r>
+                <a:endParaRPr lang="en-US" dirty="0"/>
+              </a:p>
+            </p:txBody>
+          </p:sp>
+        </p:grpSp>
+        <p:grpSp>
+          <p:nvGrpSpPr>
+            <p:cNvPr id="62" name="Group 61"/>
+            <p:cNvGrpSpPr/>
+            <p:nvPr/>
+          </p:nvGrpSpPr>
+          <p:grpSpPr>
+            <a:xfrm>
+              <a:off x="3742743" y="2624114"/>
+              <a:ext cx="1913730" cy="381000"/>
+              <a:chOff x="6173665" y="3203602"/>
+              <a:chExt cx="1913730" cy="381000"/>
+            </a:xfrm>
+          </p:grpSpPr>
+          <p:sp>
+            <p:nvSpPr>
+              <p:cNvPr id="66" name="Rectangle 65"/>
+              <p:cNvSpPr/>
+              <p:nvPr/>
+            </p:nvSpPr>
+            <p:spPr>
+              <a:xfrm>
+                <a:off x="6173665" y="3203602"/>
+                <a:ext cx="1913730" cy="381000"/>
+              </a:xfrm>
+              <a:prstGeom prst="rect">
+                <a:avLst/>
+              </a:prstGeom>
+              <a:noFill/>
+            </p:spPr>
+            <p:style>
+              <a:lnRef idx="2">
+                <a:schemeClr val="accent1">
+                  <a:shade val="50000"/>
+                </a:schemeClr>
+              </a:lnRef>
+              <a:fillRef idx="1">
+                <a:schemeClr val="accent1"/>
+              </a:fillRef>
+              <a:effectRef idx="0">
+                <a:schemeClr val="accent1"/>
+              </a:effectRef>
+              <a:fontRef idx="minor">
+                <a:schemeClr val="lt1"/>
+              </a:fontRef>
+            </p:style>
+            <p:txBody>
+              <a:bodyPr rtlCol="0" anchor="ctr"/>
+              <a:lstStyle/>
+              <a:p>
+                <a:pPr algn="ctr"/>
+                <a:endParaRPr lang="en-US"/>
+              </a:p>
+            </p:txBody>
+          </p:sp>
+          <p:sp>
+            <p:nvSpPr>
+              <p:cNvPr id="67" name="TextBox 66"/>
+              <p:cNvSpPr txBox="1"/>
+              <p:nvPr/>
+            </p:nvSpPr>
+            <p:spPr>
+              <a:xfrm>
+                <a:off x="6267056" y="3203602"/>
+                <a:ext cx="1726948" cy="369332"/>
+              </a:xfrm>
+              <a:prstGeom prst="rect">
+                <a:avLst/>
+              </a:prstGeom>
+              <a:noFill/>
+            </p:spPr>
+            <p:txBody>
+              <a:bodyPr wrap="none" rtlCol="0">
+                <a:spAutoFit/>
+              </a:bodyPr>
+              <a:lstStyle/>
+              <a:p>
+                <a:pPr algn="ctr"/>
+                <a:r>
+                  <a:rPr lang="en-US" dirty="0" err="1" smtClean="0"/>
+                  <a:t>Oracle</a:t>
+                </a:r>
+                <a:r>
+                  <a:rPr lang="en-US" dirty="0" err="1" smtClean="0"/>
+                  <a:t>Catalogue</a:t>
+                </a:r>
+                <a:endParaRPr lang="en-US" dirty="0"/>
+              </a:p>
+            </p:txBody>
+          </p:sp>
+        </p:grpSp>
+        <p:cxnSp>
+          <p:nvCxnSpPr>
+            <p:cNvPr id="63" name="Elbow Connector 62"/>
+            <p:cNvCxnSpPr>
+              <a:stCxn id="55" idx="3"/>
+              <a:endCxn id="67" idx="0"/>
+            </p:cNvCxnSpPr>
+            <p:nvPr/>
+          </p:nvCxnSpPr>
+          <p:spPr>
+            <a:xfrm rot="16200000" flipH="1">
+              <a:off x="6154875" y="1996543"/>
+              <a:ext cx="313173" cy="956866"/>
+            </a:xfrm>
+            <a:prstGeom prst="bentConnector3">
+              <a:avLst>
+                <a:gd name="adj1" fmla="val 50000"/>
+              </a:avLst>
+            </a:prstGeom>
+          </p:spPr>
+          <p:style>
+            <a:lnRef idx="1">
+              <a:schemeClr val="accent1"/>
+            </a:lnRef>
+            <a:fillRef idx="0">
+              <a:schemeClr val="accent1"/>
+            </a:fillRef>
+            <a:effectRef idx="0">
+              <a:schemeClr val="accent1"/>
+            </a:effectRef>
+            <a:fontRef idx="minor">
+              <a:schemeClr val="tx1"/>
+            </a:fontRef>
+          </p:style>
+        </p:cxnSp>
+        <p:cxnSp>
+          <p:nvCxnSpPr>
+            <p:cNvPr id="64" name="Elbow Connector 63"/>
+            <p:cNvCxnSpPr>
+              <a:stCxn id="55" idx="3"/>
+            </p:cNvCxnSpPr>
+            <p:nvPr/>
+          </p:nvCxnSpPr>
+          <p:spPr>
+            <a:xfrm rot="5400000">
+              <a:off x="5113456" y="1904542"/>
+              <a:ext cx="305724" cy="1133420"/>
+            </a:xfrm>
+            <a:prstGeom prst="bentConnector3">
+              <a:avLst>
+                <a:gd name="adj1" fmla="val 50000"/>
+              </a:avLst>
+            </a:prstGeom>
+          </p:spPr>
+          <p:style>
+            <a:lnRef idx="1">
+              <a:schemeClr val="accent1"/>
+            </a:lnRef>
+            <a:fillRef idx="0">
+              <a:schemeClr val="accent1"/>
+            </a:fillRef>
+            <a:effectRef idx="0">
+              <a:schemeClr val="accent1"/>
+            </a:effectRef>
+            <a:fontRef idx="minor">
+              <a:schemeClr val="tx1"/>
+            </a:fontRef>
+          </p:style>
+        </p:cxnSp>
+        <p:cxnSp>
+          <p:nvCxnSpPr>
+            <p:cNvPr id="65" name="Elbow Connector 64"/>
+            <p:cNvCxnSpPr>
+              <a:stCxn id="55" idx="3"/>
+            </p:cNvCxnSpPr>
+            <p:nvPr/>
+          </p:nvCxnSpPr>
+          <p:spPr>
+            <a:xfrm rot="16200000" flipH="1">
+              <a:off x="7198469" y="952948"/>
+              <a:ext cx="316270" cy="3047153"/>
+            </a:xfrm>
+            <a:prstGeom prst="bentConnector3">
+              <a:avLst>
+                <a:gd name="adj1" fmla="val 50000"/>
+              </a:avLst>
             </a:prstGeom>
           </p:spPr>
           <p:style>
@@ -3859,131 +4158,6 @@
           </p:style>
         </p:cxnSp>
       </p:grpSp>
-      <p:sp>
-        <p:nvSpPr>
-          <p:cNvPr id="27" name="TextBox 26"/>
-          <p:cNvSpPr txBox="1"/>
-          <p:nvPr/>
-        </p:nvSpPr>
-        <p:spPr>
-          <a:xfrm>
-            <a:off x="65662" y="1202723"/>
-            <a:ext cx="6956831" cy="923330"/>
-          </a:xfrm>
-          <a:prstGeom prst="rect">
-            <a:avLst/>
-          </a:prstGeom>
-          <a:noFill/>
-        </p:spPr>
-        <p:txBody>
-          <a:bodyPr wrap="square" rtlCol="0">
-            <a:spAutoFit/>
-          </a:bodyPr>
-          <a:lstStyle/>
-          <a:p>
-            <a:pPr algn="just"/>
-            <a:r>
-              <a:rPr lang="en-US" dirty="0" smtClean="0"/>
-              <a:t>The </a:t>
-            </a:r>
-            <a:r>
-              <a:rPr lang="en-US" dirty="0" err="1" smtClean="0"/>
-              <a:t>RdbmsCatalogue</a:t>
-            </a:r>
-            <a:r>
-              <a:rPr lang="en-US" dirty="0" smtClean="0"/>
-              <a:t> implements of all the Catalogue methods except for those that require database vendor specific API accesses such as bulk inserts or database vendor specific SQL such as database sequences.</a:t>
-            </a:r>
-            <a:endParaRPr lang="en-US" dirty="0"/>
-          </a:p>
-        </p:txBody>
-      </p:sp>
-      <p:sp>
-        <p:nvSpPr>
-          <p:cNvPr id="28" name="TextBox 27"/>
-          <p:cNvSpPr txBox="1"/>
-          <p:nvPr/>
-        </p:nvSpPr>
-        <p:spPr>
-          <a:xfrm>
-            <a:off x="57266" y="90723"/>
-            <a:ext cx="6956831" cy="923330"/>
-          </a:xfrm>
-          <a:prstGeom prst="rect">
-            <a:avLst/>
-          </a:prstGeom>
-          <a:noFill/>
-        </p:spPr>
-        <p:txBody>
-          <a:bodyPr wrap="square" rtlCol="0">
-            <a:spAutoFit/>
-          </a:bodyPr>
-          <a:lstStyle/>
-          <a:p>
-            <a:pPr algn="just"/>
-            <a:r>
-              <a:rPr lang="en-US" dirty="0" smtClean="0"/>
-              <a:t>The Catalogue class is an abstract interface class which facilitates the ability to implement the CTA catalogue using backend data storage technologies other than relational databases.  </a:t>
-            </a:r>
-            <a:endParaRPr lang="en-US" dirty="0"/>
-          </a:p>
-        </p:txBody>
-      </p:sp>
-      <p:sp>
-        <p:nvSpPr>
-          <p:cNvPr id="29" name="TextBox 28"/>
-          <p:cNvSpPr txBox="1"/>
-          <p:nvPr/>
-        </p:nvSpPr>
-        <p:spPr>
-          <a:xfrm>
-            <a:off x="73595" y="4252332"/>
-            <a:ext cx="5931276" cy="1200329"/>
-          </a:xfrm>
-          <a:prstGeom prst="rect">
-            <a:avLst/>
-          </a:prstGeom>
-          <a:noFill/>
-        </p:spPr>
-        <p:txBody>
-          <a:bodyPr wrap="square" rtlCol="0">
-            <a:spAutoFit/>
-          </a:bodyPr>
-          <a:lstStyle/>
-          <a:p>
-            <a:pPr algn="just"/>
-            <a:r>
-              <a:rPr lang="en-US" dirty="0" err="1" smtClean="0"/>
-              <a:t>InMemoryCatalogue</a:t>
-            </a:r>
-            <a:r>
-              <a:rPr lang="en-US" dirty="0" smtClean="0"/>
-              <a:t> objects are different to other </a:t>
-            </a:r>
-            <a:r>
-              <a:rPr lang="en-US" dirty="0" err="1" smtClean="0"/>
-              <a:t>RdbmsCatalogue</a:t>
-            </a:r>
-            <a:r>
-              <a:rPr lang="en-US" dirty="0" smtClean="0"/>
-              <a:t> objects that connect to external databases because </a:t>
-            </a:r>
-            <a:r>
-              <a:rPr lang="en-US" dirty="0" err="1"/>
-              <a:t>InMemoryCatalogue</a:t>
-            </a:r>
-            <a:r>
-              <a:rPr lang="en-US" dirty="0"/>
-              <a:t> objects </a:t>
-            </a:r>
-            <a:r>
-              <a:rPr lang="en-US" dirty="0" smtClean="0"/>
-              <a:t> create the database schema when they are first instantiated. </a:t>
-            </a:r>
-            <a:endParaRPr lang="en-US" dirty="0"/>
-          </a:p>
-        </p:txBody>
-      </p:sp>
     </p:spTree>
     <p:extLst>
       <p:ext uri="{BB962C8B-B14F-4D97-AF65-F5344CB8AC3E}">
@@ -4746,11 +4920,7 @@
               </a:r>
               <a:r>
                 <a:rPr lang="en-US" dirty="0" smtClean="0"/>
-                <a:t>rapper</a:t>
-              </a:r>
-              <a:r>
-                <a:rPr lang="en-US" dirty="0" smtClean="0"/>
-                <a:t>::Conn</a:t>
+                <a:t>rapper::Conn</a:t>
               </a:r>
               <a:endParaRPr lang="en-US" dirty="0"/>
             </a:p>
@@ -5421,11 +5591,7 @@
             </a:r>
             <a:r>
               <a:rPr lang="en-US" dirty="0" smtClean="0"/>
-              <a:t>rapper</a:t>
-            </a:r>
-            <a:r>
-              <a:rPr lang="en-US" dirty="0" smtClean="0"/>
-              <a:t>::</a:t>
+              <a:t>rapper::</a:t>
             </a:r>
             <a:r>
               <a:rPr lang="en-US" dirty="0" err="1" smtClean="0"/>
@@ -5464,11 +5630,7 @@
             </a:r>
             <a:r>
               <a:rPr lang="en-US" dirty="0" smtClean="0"/>
-              <a:t>rapper</a:t>
-            </a:r>
-            <a:r>
-              <a:rPr lang="en-US" dirty="0" smtClean="0"/>
-              <a:t>::</a:t>
+              <a:t>rapper::</a:t>
             </a:r>
             <a:r>
               <a:rPr lang="mr-IN" dirty="0" smtClean="0"/>
@@ -5583,11 +5745,7 @@
             </a:r>
             <a:r>
               <a:rPr lang="en-US" dirty="0" smtClean="0"/>
-              <a:t>rapper</a:t>
-            </a:r>
-            <a:r>
-              <a:rPr lang="en-US" dirty="0" smtClean="0"/>
-              <a:t>::Conn</a:t>
+              <a:t>rapper::Conn</a:t>
             </a:r>
             <a:endParaRPr lang="en-US" dirty="0"/>
           </a:p>
@@ -5928,11 +6086,7 @@
             </a:r>
             <a:r>
               <a:rPr lang="en-US" dirty="0" smtClean="0"/>
-              <a:t>rapper</a:t>
-            </a:r>
-            <a:r>
-              <a:rPr lang="en-US" dirty="0" smtClean="0"/>
-              <a:t>::</a:t>
+              <a:t>rapper::</a:t>
             </a:r>
             <a:r>
               <a:rPr lang="en-US" dirty="0" err="1" smtClean="0"/>
@@ -5971,11 +6125,7 @@
             </a:r>
             <a:r>
               <a:rPr lang="en-US" dirty="0" smtClean="0"/>
-              <a:t>rapper</a:t>
-            </a:r>
-            <a:r>
-              <a:rPr lang="en-US" dirty="0" smtClean="0"/>
-              <a:t>::</a:t>
+              <a:t>rapper::</a:t>
             </a:r>
             <a:r>
               <a:rPr lang="mr-IN" dirty="0" smtClean="0"/>
@@ -6055,11 +6205,7 @@
             </a:r>
             <a:r>
               <a:rPr lang="en-US" dirty="0" smtClean="0"/>
-              <a:t>rapper</a:t>
-            </a:r>
-            <a:r>
-              <a:rPr lang="en-US" dirty="0" smtClean="0"/>
-              <a:t>::</a:t>
+              <a:t>rapper::</a:t>
             </a:r>
             <a:r>
               <a:rPr lang="en-US" dirty="0" err="1" smtClean="0"/>
@@ -6348,11 +6494,7 @@
             </a:r>
             <a:r>
               <a:rPr lang="en-US" dirty="0" smtClean="0"/>
-              <a:t>rapper</a:t>
-            </a:r>
-            <a:r>
-              <a:rPr lang="en-US" dirty="0" smtClean="0"/>
-              <a:t>::</a:t>
+              <a:t>rapper::</a:t>
             </a:r>
             <a:r>
               <a:rPr lang="en-US" dirty="0" err="1" smtClean="0"/>
@@ -6391,11 +6533,7 @@
             </a:r>
             <a:r>
               <a:rPr lang="en-US" dirty="0" smtClean="0"/>
-              <a:t>rapper</a:t>
-            </a:r>
-            <a:r>
-              <a:rPr lang="en-US" dirty="0" smtClean="0"/>
-              <a:t>::</a:t>
+              <a:t>rapper::</a:t>
             </a:r>
             <a:r>
               <a:rPr lang="mr-IN" dirty="0" smtClean="0"/>
@@ -6475,11 +6613,7 @@
             </a:r>
             <a:r>
               <a:rPr lang="en-US" dirty="0" smtClean="0"/>
-              <a:t>rapper</a:t>
-            </a:r>
-            <a:r>
-              <a:rPr lang="en-US" dirty="0" smtClean="0"/>
-              <a:t>::</a:t>
+              <a:t>rapper::</a:t>
             </a:r>
             <a:r>
               <a:rPr lang="en-US" dirty="0" err="1" smtClean="0"/>
@@ -6715,6 +6849,1101 @@
       </p:par>
     </p:tnLst>
   </p:timing>
+</p:sld>
+</file>
+
+<file path=ppt/slides/slide3.xml><?xml version="1.0" encoding="utf-8"?>
+<p:sld xmlns:a="http://schemas.openxmlformats.org/drawingml/2006/main" xmlns:r="http://schemas.openxmlformats.org/officeDocument/2006/relationships" xmlns:p="http://schemas.openxmlformats.org/presentationml/2006/main">
+  <p:cSld>
+    <p:spTree>
+      <p:nvGrpSpPr>
+        <p:cNvPr id="1" name=""/>
+        <p:cNvGrpSpPr/>
+        <p:nvPr/>
+      </p:nvGrpSpPr>
+      <p:grpSpPr>
+        <a:xfrm>
+          <a:off x="0" y="0"/>
+          <a:ext cx="0" cy="0"/>
+          <a:chOff x="0" y="0"/>
+          <a:chExt cx="0" cy="0"/>
+        </a:xfrm>
+      </p:grpSpPr>
+      <p:grpSp>
+        <p:nvGrpSpPr>
+          <p:cNvPr id="60" name="Group 59"/>
+          <p:cNvGrpSpPr/>
+          <p:nvPr/>
+        </p:nvGrpSpPr>
+        <p:grpSpPr>
+          <a:xfrm>
+            <a:off x="1031238" y="636715"/>
+            <a:ext cx="8805808" cy="4358053"/>
+            <a:chOff x="1031238" y="636715"/>
+            <a:chExt cx="8805808" cy="4358053"/>
+          </a:xfrm>
+        </p:grpSpPr>
+        <p:sp>
+          <p:nvSpPr>
+            <p:cNvPr id="3" name="Rectangle 2"/>
+            <p:cNvSpPr/>
+            <p:nvPr/>
+          </p:nvSpPr>
+          <p:spPr>
+            <a:xfrm>
+              <a:off x="5038483" y="636715"/>
+              <a:ext cx="1608668" cy="381000"/>
+            </a:xfrm>
+            <a:prstGeom prst="rect">
+              <a:avLst/>
+            </a:prstGeom>
+            <a:noFill/>
+          </p:spPr>
+          <p:style>
+            <a:lnRef idx="2">
+              <a:schemeClr val="accent1">
+                <a:shade val="50000"/>
+              </a:schemeClr>
+            </a:lnRef>
+            <a:fillRef idx="1">
+              <a:schemeClr val="accent1"/>
+            </a:fillRef>
+            <a:effectRef idx="0">
+              <a:schemeClr val="accent1"/>
+            </a:effectRef>
+            <a:fontRef idx="minor">
+              <a:schemeClr val="lt1"/>
+            </a:fontRef>
+          </p:style>
+          <p:txBody>
+            <a:bodyPr rtlCol="0" anchor="ctr"/>
+            <a:lstStyle/>
+            <a:p>
+              <a:pPr algn="ctr"/>
+              <a:endParaRPr lang="en-US"/>
+            </a:p>
+          </p:txBody>
+        </p:sp>
+        <p:sp>
+          <p:nvSpPr>
+            <p:cNvPr id="4" name="TextBox 3"/>
+            <p:cNvSpPr txBox="1"/>
+            <p:nvPr/>
+          </p:nvSpPr>
+          <p:spPr>
+            <a:xfrm>
+              <a:off x="5271817" y="648383"/>
+              <a:ext cx="1122423" cy="369332"/>
+            </a:xfrm>
+            <a:prstGeom prst="rect">
+              <a:avLst/>
+            </a:prstGeom>
+            <a:noFill/>
+          </p:spPr>
+          <p:txBody>
+            <a:bodyPr wrap="none" rtlCol="0">
+              <a:spAutoFit/>
+            </a:bodyPr>
+            <a:lstStyle/>
+            <a:p>
+              <a:pPr algn="ctr"/>
+              <a:r>
+                <a:rPr lang="en-US" dirty="0" smtClean="0"/>
+                <a:t>Catalogue</a:t>
+              </a:r>
+              <a:endParaRPr lang="en-US" dirty="0"/>
+            </a:p>
+          </p:txBody>
+        </p:sp>
+        <p:sp>
+          <p:nvSpPr>
+            <p:cNvPr id="5" name="Rectangle 4"/>
+            <p:cNvSpPr/>
+            <p:nvPr/>
+          </p:nvSpPr>
+          <p:spPr>
+            <a:xfrm>
+              <a:off x="5038483" y="1595514"/>
+              <a:ext cx="1608668" cy="381000"/>
+            </a:xfrm>
+            <a:prstGeom prst="rect">
+              <a:avLst/>
+            </a:prstGeom>
+            <a:noFill/>
+          </p:spPr>
+          <p:style>
+            <a:lnRef idx="2">
+              <a:schemeClr val="accent1">
+                <a:shade val="50000"/>
+              </a:schemeClr>
+            </a:lnRef>
+            <a:fillRef idx="1">
+              <a:schemeClr val="accent1"/>
+            </a:fillRef>
+            <a:effectRef idx="0">
+              <a:schemeClr val="accent1"/>
+            </a:effectRef>
+            <a:fontRef idx="minor">
+              <a:schemeClr val="lt1"/>
+            </a:fontRef>
+          </p:style>
+          <p:txBody>
+            <a:bodyPr rtlCol="0" anchor="ctr"/>
+            <a:lstStyle/>
+            <a:p>
+              <a:pPr algn="ctr"/>
+              <a:endParaRPr lang="en-US"/>
+            </a:p>
+          </p:txBody>
+        </p:sp>
+        <p:sp>
+          <p:nvSpPr>
+            <p:cNvPr id="6" name="TextBox 5"/>
+            <p:cNvSpPr txBox="1"/>
+            <p:nvPr/>
+          </p:nvSpPr>
+          <p:spPr>
+            <a:xfrm>
+              <a:off x="4950415" y="1607182"/>
+              <a:ext cx="1765228" cy="369332"/>
+            </a:xfrm>
+            <a:prstGeom prst="rect">
+              <a:avLst/>
+            </a:prstGeom>
+            <a:noFill/>
+          </p:spPr>
+          <p:txBody>
+            <a:bodyPr wrap="none" rtlCol="0">
+              <a:spAutoFit/>
+            </a:bodyPr>
+            <a:lstStyle/>
+            <a:p>
+              <a:pPr algn="ctr"/>
+              <a:r>
+                <a:rPr lang="en-US" dirty="0" err="1" smtClean="0"/>
+                <a:t>RdbmsCatalogue</a:t>
+              </a:r>
+              <a:endParaRPr lang="en-US" dirty="0"/>
+            </a:p>
+          </p:txBody>
+        </p:sp>
+        <p:cxnSp>
+          <p:nvCxnSpPr>
+            <p:cNvPr id="9" name="Straight Connector 8"/>
+            <p:cNvCxnSpPr/>
+            <p:nvPr/>
+          </p:nvCxnSpPr>
+          <p:spPr>
+            <a:xfrm>
+              <a:off x="5833028" y="1387059"/>
+              <a:ext cx="1" cy="220123"/>
+            </a:xfrm>
+            <a:prstGeom prst="line">
+              <a:avLst/>
+            </a:prstGeom>
+          </p:spPr>
+          <p:style>
+            <a:lnRef idx="1">
+              <a:schemeClr val="accent1"/>
+            </a:lnRef>
+            <a:fillRef idx="0">
+              <a:schemeClr val="accent1"/>
+            </a:fillRef>
+            <a:effectRef idx="0">
+              <a:schemeClr val="accent1"/>
+            </a:effectRef>
+            <a:fontRef idx="minor">
+              <a:schemeClr val="tx1"/>
+            </a:fontRef>
+          </p:style>
+        </p:cxnSp>
+        <p:sp>
+          <p:nvSpPr>
+            <p:cNvPr id="15" name="Triangle 14"/>
+            <p:cNvSpPr/>
+            <p:nvPr/>
+          </p:nvSpPr>
+          <p:spPr>
+            <a:xfrm>
+              <a:off x="5543155" y="1964898"/>
+              <a:ext cx="579745" cy="353492"/>
+            </a:xfrm>
+            <a:prstGeom prst="triangle">
+              <a:avLst/>
+            </a:prstGeom>
+            <a:solidFill>
+              <a:schemeClr val="bg1"/>
+            </a:solidFill>
+          </p:spPr>
+          <p:style>
+            <a:lnRef idx="2">
+              <a:schemeClr val="accent1">
+                <a:shade val="50000"/>
+              </a:schemeClr>
+            </a:lnRef>
+            <a:fillRef idx="1">
+              <a:schemeClr val="accent1"/>
+            </a:fillRef>
+            <a:effectRef idx="0">
+              <a:schemeClr val="accent1"/>
+            </a:effectRef>
+            <a:fontRef idx="minor">
+              <a:schemeClr val="lt1"/>
+            </a:fontRef>
+          </p:style>
+          <p:txBody>
+            <a:bodyPr rtlCol="0" anchor="ctr"/>
+            <a:lstStyle/>
+            <a:p>
+              <a:pPr algn="ctr"/>
+              <a:endParaRPr lang="en-US"/>
+            </a:p>
+          </p:txBody>
+        </p:sp>
+        <p:cxnSp>
+          <p:nvCxnSpPr>
+            <p:cNvPr id="17" name="Elbow Connector 16"/>
+            <p:cNvCxnSpPr>
+              <a:stCxn id="15" idx="3"/>
+              <a:endCxn id="38" idx="0"/>
+            </p:cNvCxnSpPr>
+            <p:nvPr/>
+          </p:nvCxnSpPr>
+          <p:spPr>
+            <a:xfrm rot="5400000">
+              <a:off x="4067506" y="860206"/>
+              <a:ext cx="307339" cy="3223707"/>
+            </a:xfrm>
+            <a:prstGeom prst="bentConnector3">
+              <a:avLst>
+                <a:gd name="adj1" fmla="val 50000"/>
+              </a:avLst>
+            </a:prstGeom>
+          </p:spPr>
+          <p:style>
+            <a:lnRef idx="1">
+              <a:schemeClr val="accent1"/>
+            </a:lnRef>
+            <a:fillRef idx="0">
+              <a:schemeClr val="accent1"/>
+            </a:fillRef>
+            <a:effectRef idx="0">
+              <a:schemeClr val="accent1"/>
+            </a:effectRef>
+            <a:fontRef idx="minor">
+              <a:schemeClr val="tx1"/>
+            </a:fontRef>
+          </p:style>
+        </p:cxnSp>
+        <p:sp>
+          <p:nvSpPr>
+            <p:cNvPr id="18" name="Triangle 17"/>
+            <p:cNvSpPr/>
+            <p:nvPr/>
+          </p:nvSpPr>
+          <p:spPr>
+            <a:xfrm>
+              <a:off x="5543155" y="1033567"/>
+              <a:ext cx="579745" cy="353492"/>
+            </a:xfrm>
+            <a:prstGeom prst="triangle">
+              <a:avLst/>
+            </a:prstGeom>
+            <a:solidFill>
+              <a:schemeClr val="bg1"/>
+            </a:solidFill>
+          </p:spPr>
+          <p:style>
+            <a:lnRef idx="2">
+              <a:schemeClr val="accent1">
+                <a:shade val="50000"/>
+              </a:schemeClr>
+            </a:lnRef>
+            <a:fillRef idx="1">
+              <a:schemeClr val="accent1"/>
+            </a:fillRef>
+            <a:effectRef idx="0">
+              <a:schemeClr val="accent1"/>
+            </a:effectRef>
+            <a:fontRef idx="minor">
+              <a:schemeClr val="lt1"/>
+            </a:fontRef>
+          </p:style>
+          <p:txBody>
+            <a:bodyPr rtlCol="0" anchor="ctr"/>
+            <a:lstStyle/>
+            <a:p>
+              <a:pPr algn="ctr"/>
+              <a:endParaRPr lang="en-US"/>
+            </a:p>
+          </p:txBody>
+        </p:sp>
+        <p:sp>
+          <p:nvSpPr>
+            <p:cNvPr id="19" name="Rectangle 18"/>
+            <p:cNvSpPr/>
+            <p:nvPr/>
+          </p:nvSpPr>
+          <p:spPr>
+            <a:xfrm>
+              <a:off x="1031238" y="3582433"/>
+              <a:ext cx="3166893" cy="369332"/>
+            </a:xfrm>
+            <a:prstGeom prst="rect">
+              <a:avLst/>
+            </a:prstGeom>
+            <a:noFill/>
+          </p:spPr>
+          <p:style>
+            <a:lnRef idx="2">
+              <a:schemeClr val="accent1">
+                <a:shade val="50000"/>
+              </a:schemeClr>
+            </a:lnRef>
+            <a:fillRef idx="1">
+              <a:schemeClr val="accent1"/>
+            </a:fillRef>
+            <a:effectRef idx="0">
+              <a:schemeClr val="accent1"/>
+            </a:effectRef>
+            <a:fontRef idx="minor">
+              <a:schemeClr val="lt1"/>
+            </a:fontRef>
+          </p:style>
+          <p:txBody>
+            <a:bodyPr rtlCol="0" anchor="ctr"/>
+            <a:lstStyle/>
+            <a:p>
+              <a:pPr algn="ctr"/>
+              <a:endParaRPr lang="en-US"/>
+            </a:p>
+          </p:txBody>
+        </p:sp>
+        <p:sp>
+          <p:nvSpPr>
+            <p:cNvPr id="20" name="TextBox 19"/>
+            <p:cNvSpPr txBox="1"/>
+            <p:nvPr/>
+          </p:nvSpPr>
+          <p:spPr>
+            <a:xfrm>
+              <a:off x="1031238" y="3594101"/>
+              <a:ext cx="3166894" cy="369332"/>
+            </a:xfrm>
+            <a:prstGeom prst="rect">
+              <a:avLst/>
+            </a:prstGeom>
+            <a:noFill/>
+          </p:spPr>
+          <p:txBody>
+            <a:bodyPr wrap="none" rtlCol="0">
+              <a:spAutoFit/>
+            </a:bodyPr>
+            <a:lstStyle/>
+            <a:p>
+              <a:pPr algn="ctr"/>
+              <a:r>
+                <a:rPr lang="en-US" dirty="0" err="1" smtClean="0"/>
+                <a:t>SchemaCreatingSqliteCatalogue</a:t>
+              </a:r>
+              <a:endParaRPr lang="en-US" dirty="0"/>
+            </a:p>
+          </p:txBody>
+        </p:sp>
+        <p:sp>
+          <p:nvSpPr>
+            <p:cNvPr id="21" name="Rectangle 20"/>
+            <p:cNvSpPr/>
+            <p:nvPr/>
+          </p:nvSpPr>
+          <p:spPr>
+            <a:xfrm>
+              <a:off x="1560767" y="4602100"/>
+              <a:ext cx="2105961" cy="392668"/>
+            </a:xfrm>
+            <a:prstGeom prst="rect">
+              <a:avLst/>
+            </a:prstGeom>
+            <a:noFill/>
+          </p:spPr>
+          <p:style>
+            <a:lnRef idx="2">
+              <a:schemeClr val="accent1">
+                <a:shade val="50000"/>
+              </a:schemeClr>
+            </a:lnRef>
+            <a:fillRef idx="1">
+              <a:schemeClr val="accent1"/>
+            </a:fillRef>
+            <a:effectRef idx="0">
+              <a:schemeClr val="accent1"/>
+            </a:effectRef>
+            <a:fontRef idx="minor">
+              <a:schemeClr val="lt1"/>
+            </a:fontRef>
+          </p:style>
+          <p:txBody>
+            <a:bodyPr rtlCol="0" anchor="ctr"/>
+            <a:lstStyle/>
+            <a:p>
+              <a:pPr algn="ctr"/>
+              <a:endParaRPr lang="en-US"/>
+            </a:p>
+          </p:txBody>
+        </p:sp>
+        <p:sp>
+          <p:nvSpPr>
+            <p:cNvPr id="22" name="TextBox 21"/>
+            <p:cNvSpPr txBox="1"/>
+            <p:nvPr/>
+          </p:nvSpPr>
+          <p:spPr>
+            <a:xfrm>
+              <a:off x="1560767" y="4613768"/>
+              <a:ext cx="2105962" cy="369332"/>
+            </a:xfrm>
+            <a:prstGeom prst="rect">
+              <a:avLst/>
+            </a:prstGeom>
+            <a:noFill/>
+          </p:spPr>
+          <p:txBody>
+            <a:bodyPr wrap="none" rtlCol="0">
+              <a:spAutoFit/>
+            </a:bodyPr>
+            <a:lstStyle/>
+            <a:p>
+              <a:pPr algn="ctr"/>
+              <a:r>
+                <a:rPr lang="en-US" dirty="0" err="1" smtClean="0"/>
+                <a:t>InMemoryCatalogue</a:t>
+              </a:r>
+              <a:endParaRPr lang="en-US" dirty="0"/>
+            </a:p>
+          </p:txBody>
+        </p:sp>
+        <p:sp>
+          <p:nvSpPr>
+            <p:cNvPr id="23" name="Triangle 22"/>
+            <p:cNvSpPr/>
+            <p:nvPr/>
+          </p:nvSpPr>
+          <p:spPr>
+            <a:xfrm>
+              <a:off x="2314086" y="3012563"/>
+              <a:ext cx="579745" cy="353492"/>
+            </a:xfrm>
+            <a:prstGeom prst="triangle">
+              <a:avLst/>
+            </a:prstGeom>
+            <a:solidFill>
+              <a:schemeClr val="bg1"/>
+            </a:solidFill>
+          </p:spPr>
+          <p:style>
+            <a:lnRef idx="2">
+              <a:schemeClr val="accent1">
+                <a:shade val="50000"/>
+              </a:schemeClr>
+            </a:lnRef>
+            <a:fillRef idx="1">
+              <a:schemeClr val="accent1"/>
+            </a:fillRef>
+            <a:effectRef idx="0">
+              <a:schemeClr val="accent1"/>
+            </a:effectRef>
+            <a:fontRef idx="minor">
+              <a:schemeClr val="lt1"/>
+            </a:fontRef>
+          </p:style>
+          <p:txBody>
+            <a:bodyPr rtlCol="0" anchor="ctr"/>
+            <a:lstStyle/>
+            <a:p>
+              <a:pPr algn="ctr"/>
+              <a:endParaRPr lang="en-US"/>
+            </a:p>
+          </p:txBody>
+        </p:sp>
+        <p:sp>
+          <p:nvSpPr>
+            <p:cNvPr id="24" name="Triangle 23"/>
+            <p:cNvSpPr/>
+            <p:nvPr/>
+          </p:nvSpPr>
+          <p:spPr>
+            <a:xfrm>
+              <a:off x="2314086" y="3968405"/>
+              <a:ext cx="579745" cy="353492"/>
+            </a:xfrm>
+            <a:prstGeom prst="triangle">
+              <a:avLst/>
+            </a:prstGeom>
+            <a:solidFill>
+              <a:schemeClr val="bg1"/>
+            </a:solidFill>
+          </p:spPr>
+          <p:style>
+            <a:lnRef idx="2">
+              <a:schemeClr val="accent1">
+                <a:shade val="50000"/>
+              </a:schemeClr>
+            </a:lnRef>
+            <a:fillRef idx="1">
+              <a:schemeClr val="accent1"/>
+            </a:fillRef>
+            <a:effectRef idx="0">
+              <a:schemeClr val="accent1"/>
+            </a:effectRef>
+            <a:fontRef idx="minor">
+              <a:schemeClr val="lt1"/>
+            </a:fontRef>
+          </p:style>
+          <p:txBody>
+            <a:bodyPr rtlCol="0" anchor="ctr"/>
+            <a:lstStyle/>
+            <a:p>
+              <a:pPr algn="ctr"/>
+              <a:endParaRPr lang="en-US"/>
+            </a:p>
+          </p:txBody>
+        </p:sp>
+        <p:cxnSp>
+          <p:nvCxnSpPr>
+            <p:cNvPr id="25" name="Straight Connector 24"/>
+            <p:cNvCxnSpPr/>
+            <p:nvPr/>
+          </p:nvCxnSpPr>
+          <p:spPr>
+            <a:xfrm>
+              <a:off x="2603959" y="3366055"/>
+              <a:ext cx="10726" cy="228046"/>
+            </a:xfrm>
+            <a:prstGeom prst="line">
+              <a:avLst/>
+            </a:prstGeom>
+          </p:spPr>
+          <p:style>
+            <a:lnRef idx="1">
+              <a:schemeClr val="accent1"/>
+            </a:lnRef>
+            <a:fillRef idx="0">
+              <a:schemeClr val="accent1"/>
+            </a:fillRef>
+            <a:effectRef idx="0">
+              <a:schemeClr val="accent1"/>
+            </a:effectRef>
+            <a:fontRef idx="minor">
+              <a:schemeClr val="tx1"/>
+            </a:fontRef>
+          </p:style>
+        </p:cxnSp>
+        <p:cxnSp>
+          <p:nvCxnSpPr>
+            <p:cNvPr id="26" name="Straight Connector 25"/>
+            <p:cNvCxnSpPr/>
+            <p:nvPr/>
+          </p:nvCxnSpPr>
+          <p:spPr>
+            <a:xfrm>
+              <a:off x="2603959" y="4321897"/>
+              <a:ext cx="9789" cy="291871"/>
+            </a:xfrm>
+            <a:prstGeom prst="line">
+              <a:avLst/>
+            </a:prstGeom>
+          </p:spPr>
+          <p:style>
+            <a:lnRef idx="1">
+              <a:schemeClr val="accent1"/>
+            </a:lnRef>
+            <a:fillRef idx="0">
+              <a:schemeClr val="accent1"/>
+            </a:fillRef>
+            <a:effectRef idx="0">
+              <a:schemeClr val="accent1"/>
+            </a:effectRef>
+            <a:fontRef idx="minor">
+              <a:schemeClr val="tx1"/>
+            </a:fontRef>
+          </p:style>
+        </p:cxnSp>
+        <p:grpSp>
+          <p:nvGrpSpPr>
+            <p:cNvPr id="29" name="Group 28"/>
+            <p:cNvGrpSpPr/>
+            <p:nvPr/>
+          </p:nvGrpSpPr>
+          <p:grpSpPr>
+            <a:xfrm>
+              <a:off x="5833029" y="2631563"/>
+              <a:ext cx="1913730" cy="381000"/>
+              <a:chOff x="6173665" y="3203602"/>
+              <a:chExt cx="1913730" cy="381000"/>
+            </a:xfrm>
+          </p:grpSpPr>
+          <p:sp>
+            <p:nvSpPr>
+              <p:cNvPr id="27" name="Rectangle 26"/>
+              <p:cNvSpPr/>
+              <p:nvPr/>
+            </p:nvSpPr>
+            <p:spPr>
+              <a:xfrm>
+                <a:off x="6173665" y="3203602"/>
+                <a:ext cx="1913730" cy="381000"/>
+              </a:xfrm>
+              <a:prstGeom prst="rect">
+                <a:avLst/>
+              </a:prstGeom>
+              <a:noFill/>
+            </p:spPr>
+            <p:style>
+              <a:lnRef idx="2">
+                <a:schemeClr val="accent1">
+                  <a:shade val="50000"/>
+                </a:schemeClr>
+              </a:lnRef>
+              <a:fillRef idx="1">
+                <a:schemeClr val="accent1"/>
+              </a:fillRef>
+              <a:effectRef idx="0">
+                <a:schemeClr val="accent1"/>
+              </a:effectRef>
+              <a:fontRef idx="minor">
+                <a:schemeClr val="lt1"/>
+              </a:fontRef>
+            </p:style>
+            <p:txBody>
+              <a:bodyPr rtlCol="0" anchor="ctr"/>
+              <a:lstStyle/>
+              <a:p>
+                <a:pPr algn="ctr"/>
+                <a:endParaRPr lang="en-US"/>
+              </a:p>
+            </p:txBody>
+          </p:sp>
+          <p:sp>
+            <p:nvSpPr>
+              <p:cNvPr id="28" name="TextBox 27"/>
+              <p:cNvSpPr txBox="1"/>
+              <p:nvPr/>
+            </p:nvSpPr>
+            <p:spPr>
+              <a:xfrm>
+                <a:off x="6173665" y="3203602"/>
+                <a:ext cx="1913730" cy="369332"/>
+              </a:xfrm>
+              <a:prstGeom prst="rect">
+                <a:avLst/>
+              </a:prstGeom>
+              <a:noFill/>
+            </p:spPr>
+            <p:txBody>
+              <a:bodyPr wrap="none" rtlCol="0">
+                <a:spAutoFit/>
+              </a:bodyPr>
+              <a:lstStyle/>
+              <a:p>
+                <a:pPr algn="ctr"/>
+                <a:r>
+                  <a:rPr lang="en-US" dirty="0" err="1" smtClean="0"/>
+                  <a:t>PostgresCatalogue</a:t>
+                </a:r>
+                <a:endParaRPr lang="en-US" dirty="0"/>
+              </a:p>
+            </p:txBody>
+          </p:sp>
+        </p:grpSp>
+        <p:grpSp>
+          <p:nvGrpSpPr>
+            <p:cNvPr id="33" name="Group 32"/>
+            <p:cNvGrpSpPr/>
+            <p:nvPr/>
+          </p:nvGrpSpPr>
+          <p:grpSpPr>
+            <a:xfrm>
+              <a:off x="7923316" y="2634660"/>
+              <a:ext cx="1913730" cy="381000"/>
+              <a:chOff x="6173665" y="3203602"/>
+              <a:chExt cx="1913730" cy="381000"/>
+            </a:xfrm>
+          </p:grpSpPr>
+          <p:sp>
+            <p:nvSpPr>
+              <p:cNvPr id="34" name="Rectangle 33"/>
+              <p:cNvSpPr/>
+              <p:nvPr/>
+            </p:nvSpPr>
+            <p:spPr>
+              <a:xfrm>
+                <a:off x="6173665" y="3203602"/>
+                <a:ext cx="1913730" cy="381000"/>
+              </a:xfrm>
+              <a:prstGeom prst="rect">
+                <a:avLst/>
+              </a:prstGeom>
+              <a:noFill/>
+            </p:spPr>
+            <p:style>
+              <a:lnRef idx="2">
+                <a:schemeClr val="accent1">
+                  <a:shade val="50000"/>
+                </a:schemeClr>
+              </a:lnRef>
+              <a:fillRef idx="1">
+                <a:schemeClr val="accent1"/>
+              </a:fillRef>
+              <a:effectRef idx="0">
+                <a:schemeClr val="accent1"/>
+              </a:effectRef>
+              <a:fontRef idx="minor">
+                <a:schemeClr val="lt1"/>
+              </a:fontRef>
+            </p:style>
+            <p:txBody>
+              <a:bodyPr rtlCol="0" anchor="ctr"/>
+              <a:lstStyle/>
+              <a:p>
+                <a:pPr algn="ctr"/>
+                <a:endParaRPr lang="en-US"/>
+              </a:p>
+            </p:txBody>
+          </p:sp>
+          <p:sp>
+            <p:nvSpPr>
+              <p:cNvPr id="35" name="TextBox 34"/>
+              <p:cNvSpPr txBox="1"/>
+              <p:nvPr/>
+            </p:nvSpPr>
+            <p:spPr>
+              <a:xfrm>
+                <a:off x="6287414" y="3203602"/>
+                <a:ext cx="1686231" cy="369332"/>
+              </a:xfrm>
+              <a:prstGeom prst="rect">
+                <a:avLst/>
+              </a:prstGeom>
+              <a:noFill/>
+            </p:spPr>
+            <p:txBody>
+              <a:bodyPr wrap="none" rtlCol="0">
+                <a:spAutoFit/>
+              </a:bodyPr>
+              <a:lstStyle/>
+              <a:p>
+                <a:pPr algn="ctr"/>
+                <a:r>
+                  <a:rPr lang="en-US" dirty="0" err="1" smtClean="0"/>
+                  <a:t>Mysql</a:t>
+                </a:r>
+                <a:r>
+                  <a:rPr lang="en-US" dirty="0" err="1" smtClean="0"/>
+                  <a:t>Catalogue</a:t>
+                </a:r>
+                <a:endParaRPr lang="en-US" dirty="0"/>
+              </a:p>
+            </p:txBody>
+          </p:sp>
+        </p:grpSp>
+        <p:grpSp>
+          <p:nvGrpSpPr>
+            <p:cNvPr id="36" name="Group 35"/>
+            <p:cNvGrpSpPr/>
+            <p:nvPr/>
+          </p:nvGrpSpPr>
+          <p:grpSpPr>
+            <a:xfrm>
+              <a:off x="1652457" y="2625729"/>
+              <a:ext cx="1913730" cy="381000"/>
+              <a:chOff x="6173665" y="3203602"/>
+              <a:chExt cx="1913730" cy="381000"/>
+            </a:xfrm>
+          </p:grpSpPr>
+          <p:sp>
+            <p:nvSpPr>
+              <p:cNvPr id="37" name="Rectangle 36"/>
+              <p:cNvSpPr/>
+              <p:nvPr/>
+            </p:nvSpPr>
+            <p:spPr>
+              <a:xfrm>
+                <a:off x="6173665" y="3203602"/>
+                <a:ext cx="1913730" cy="381000"/>
+              </a:xfrm>
+              <a:prstGeom prst="rect">
+                <a:avLst/>
+              </a:prstGeom>
+              <a:noFill/>
+            </p:spPr>
+            <p:style>
+              <a:lnRef idx="2">
+                <a:schemeClr val="accent1">
+                  <a:shade val="50000"/>
+                </a:schemeClr>
+              </a:lnRef>
+              <a:fillRef idx="1">
+                <a:schemeClr val="accent1"/>
+              </a:fillRef>
+              <a:effectRef idx="0">
+                <a:schemeClr val="accent1"/>
+              </a:effectRef>
+              <a:fontRef idx="minor">
+                <a:schemeClr val="lt1"/>
+              </a:fontRef>
+            </p:style>
+            <p:txBody>
+              <a:bodyPr rtlCol="0" anchor="ctr"/>
+              <a:lstStyle/>
+              <a:p>
+                <a:pPr algn="ctr"/>
+                <a:endParaRPr lang="en-US"/>
+              </a:p>
+            </p:txBody>
+          </p:sp>
+          <p:sp>
+            <p:nvSpPr>
+              <p:cNvPr id="38" name="TextBox 37"/>
+              <p:cNvSpPr txBox="1"/>
+              <p:nvPr/>
+            </p:nvSpPr>
+            <p:spPr>
+              <a:xfrm>
+                <a:off x="6307579" y="3203602"/>
+                <a:ext cx="1645900" cy="369332"/>
+              </a:xfrm>
+              <a:prstGeom prst="rect">
+                <a:avLst/>
+              </a:prstGeom>
+              <a:noFill/>
+            </p:spPr>
+            <p:txBody>
+              <a:bodyPr wrap="none" rtlCol="0">
+                <a:spAutoFit/>
+              </a:bodyPr>
+              <a:lstStyle/>
+              <a:p>
+                <a:pPr algn="ctr"/>
+                <a:r>
+                  <a:rPr lang="en-US" dirty="0" err="1" smtClean="0"/>
+                  <a:t>Sqlite</a:t>
+                </a:r>
+                <a:r>
+                  <a:rPr lang="en-US" dirty="0" err="1" smtClean="0"/>
+                  <a:t>Catalogue</a:t>
+                </a:r>
+                <a:endParaRPr lang="en-US" dirty="0"/>
+              </a:p>
+            </p:txBody>
+          </p:sp>
+        </p:grpSp>
+        <p:grpSp>
+          <p:nvGrpSpPr>
+            <p:cNvPr id="39" name="Group 38"/>
+            <p:cNvGrpSpPr/>
+            <p:nvPr/>
+          </p:nvGrpSpPr>
+          <p:grpSpPr>
+            <a:xfrm>
+              <a:off x="3742743" y="2624114"/>
+              <a:ext cx="1913730" cy="381000"/>
+              <a:chOff x="6173665" y="3203602"/>
+              <a:chExt cx="1913730" cy="381000"/>
+            </a:xfrm>
+          </p:grpSpPr>
+          <p:sp>
+            <p:nvSpPr>
+              <p:cNvPr id="40" name="Rectangle 39"/>
+              <p:cNvSpPr/>
+              <p:nvPr/>
+            </p:nvSpPr>
+            <p:spPr>
+              <a:xfrm>
+                <a:off x="6173665" y="3203602"/>
+                <a:ext cx="1913730" cy="381000"/>
+              </a:xfrm>
+              <a:prstGeom prst="rect">
+                <a:avLst/>
+              </a:prstGeom>
+              <a:noFill/>
+            </p:spPr>
+            <p:style>
+              <a:lnRef idx="2">
+                <a:schemeClr val="accent1">
+                  <a:shade val="50000"/>
+                </a:schemeClr>
+              </a:lnRef>
+              <a:fillRef idx="1">
+                <a:schemeClr val="accent1"/>
+              </a:fillRef>
+              <a:effectRef idx="0">
+                <a:schemeClr val="accent1"/>
+              </a:effectRef>
+              <a:fontRef idx="minor">
+                <a:schemeClr val="lt1"/>
+              </a:fontRef>
+            </p:style>
+            <p:txBody>
+              <a:bodyPr rtlCol="0" anchor="ctr"/>
+              <a:lstStyle/>
+              <a:p>
+                <a:pPr algn="ctr"/>
+                <a:endParaRPr lang="en-US"/>
+              </a:p>
+            </p:txBody>
+          </p:sp>
+          <p:sp>
+            <p:nvSpPr>
+              <p:cNvPr id="41" name="TextBox 40"/>
+              <p:cNvSpPr txBox="1"/>
+              <p:nvPr/>
+            </p:nvSpPr>
+            <p:spPr>
+              <a:xfrm>
+                <a:off x="6267056" y="3203602"/>
+                <a:ext cx="1726948" cy="369332"/>
+              </a:xfrm>
+              <a:prstGeom prst="rect">
+                <a:avLst/>
+              </a:prstGeom>
+              <a:noFill/>
+            </p:spPr>
+            <p:txBody>
+              <a:bodyPr wrap="none" rtlCol="0">
+                <a:spAutoFit/>
+              </a:bodyPr>
+              <a:lstStyle/>
+              <a:p>
+                <a:pPr algn="ctr"/>
+                <a:r>
+                  <a:rPr lang="en-US" dirty="0" err="1" smtClean="0"/>
+                  <a:t>Oracle</a:t>
+                </a:r>
+                <a:r>
+                  <a:rPr lang="en-US" dirty="0" err="1" smtClean="0"/>
+                  <a:t>Catalogue</a:t>
+                </a:r>
+                <a:endParaRPr lang="en-US" dirty="0"/>
+              </a:p>
+            </p:txBody>
+          </p:sp>
+        </p:grpSp>
+        <p:cxnSp>
+          <p:nvCxnSpPr>
+            <p:cNvPr id="50" name="Elbow Connector 49"/>
+            <p:cNvCxnSpPr>
+              <a:stCxn id="15" idx="3"/>
+              <a:endCxn id="27" idx="0"/>
+            </p:cNvCxnSpPr>
+            <p:nvPr/>
+          </p:nvCxnSpPr>
+          <p:spPr>
+            <a:xfrm rot="16200000" flipH="1">
+              <a:off x="6154875" y="1996543"/>
+              <a:ext cx="313173" cy="956866"/>
+            </a:xfrm>
+            <a:prstGeom prst="bentConnector3">
+              <a:avLst>
+                <a:gd name="adj1" fmla="val 50000"/>
+              </a:avLst>
+            </a:prstGeom>
+          </p:spPr>
+          <p:style>
+            <a:lnRef idx="1">
+              <a:schemeClr val="accent1"/>
+            </a:lnRef>
+            <a:fillRef idx="0">
+              <a:schemeClr val="accent1"/>
+            </a:fillRef>
+            <a:effectRef idx="0">
+              <a:schemeClr val="accent1"/>
+            </a:effectRef>
+            <a:fontRef idx="minor">
+              <a:schemeClr val="tx1"/>
+            </a:fontRef>
+          </p:style>
+        </p:cxnSp>
+        <p:cxnSp>
+          <p:nvCxnSpPr>
+            <p:cNvPr id="51" name="Elbow Connector 50"/>
+            <p:cNvCxnSpPr>
+              <a:stCxn id="15" idx="3"/>
+              <a:endCxn id="40" idx="0"/>
+            </p:cNvCxnSpPr>
+            <p:nvPr/>
+          </p:nvCxnSpPr>
+          <p:spPr>
+            <a:xfrm rot="5400000">
+              <a:off x="5113456" y="1904542"/>
+              <a:ext cx="305724" cy="1133420"/>
+            </a:xfrm>
+            <a:prstGeom prst="bentConnector3">
+              <a:avLst>
+                <a:gd name="adj1" fmla="val 50000"/>
+              </a:avLst>
+            </a:prstGeom>
+          </p:spPr>
+          <p:style>
+            <a:lnRef idx="1">
+              <a:schemeClr val="accent1"/>
+            </a:lnRef>
+            <a:fillRef idx="0">
+              <a:schemeClr val="accent1"/>
+            </a:fillRef>
+            <a:effectRef idx="0">
+              <a:schemeClr val="accent1"/>
+            </a:effectRef>
+            <a:fontRef idx="minor">
+              <a:schemeClr val="tx1"/>
+            </a:fontRef>
+          </p:style>
+        </p:cxnSp>
+        <p:cxnSp>
+          <p:nvCxnSpPr>
+            <p:cNvPr id="52" name="Elbow Connector 51"/>
+            <p:cNvCxnSpPr>
+              <a:stCxn id="15" idx="3"/>
+              <a:endCxn id="34" idx="0"/>
+            </p:cNvCxnSpPr>
+            <p:nvPr/>
+          </p:nvCxnSpPr>
+          <p:spPr>
+            <a:xfrm rot="16200000" flipH="1">
+              <a:off x="7198469" y="952948"/>
+              <a:ext cx="316270" cy="3047153"/>
+            </a:xfrm>
+            <a:prstGeom prst="bentConnector3">
+              <a:avLst>
+                <a:gd name="adj1" fmla="val 50000"/>
+              </a:avLst>
+            </a:prstGeom>
+          </p:spPr>
+          <p:style>
+            <a:lnRef idx="1">
+              <a:schemeClr val="accent1"/>
+            </a:lnRef>
+            <a:fillRef idx="0">
+              <a:schemeClr val="accent1"/>
+            </a:fillRef>
+            <a:effectRef idx="0">
+              <a:schemeClr val="accent1"/>
+            </a:effectRef>
+            <a:fontRef idx="minor">
+              <a:schemeClr val="tx1"/>
+            </a:fontRef>
+          </p:style>
+        </p:cxnSp>
+      </p:grpSp>
+    </p:spTree>
+    <p:extLst>
+      <p:ext uri="{BB962C8B-B14F-4D97-AF65-F5344CB8AC3E}">
+        <p14:creationId xmlns:p14="http://schemas.microsoft.com/office/powerpoint/2010/main" val="1606422824"/>
+      </p:ext>
+    </p:extLst>
+  </p:cSld>
+  <p:clrMapOvr>
+    <a:masterClrMapping/>
+  </p:clrMapOvr>
 </p:sld>
 </file>
 

</xml_diff>